<commit_message>
Consolidates non-text run tags.
git-svn-id: https://okapi.googlecode.com/svn/trunk@1902 0cd2bb99-014b-0410-b875-5d0485b745ed
</commit_message>
<xml_diff>
--- a/filters/net.sf.okapi.filters.openxml.tests/gold/Peeksample.pptx
+++ b/filters/net.sf.okapi.filters.openxml.tests/gold/Peeksample.pptx
@@ -3042,8 +3042,471 @@
 </p:sldMaster>
 </file>
 
-<file path=ppt/slides/slide1.xml><?xml version="1.0" encoding="UTF-8" standalone="yes"?>
-<p:sld xmlns:a="http://schemas.openxmlformats.org/drawingml/2006/main" xmlns:r="http://schemas.openxmlformats.org/officeDocument/2006/relationships" xmlns:p="http://schemas.openxmlformats.org/presentationml/2006/main"><p:cSld><p:spTree><p:nvGrpSpPr><p:cNvPr id="1" name=""/><p:cNvGrpSpPr/><p:nvPr/></p:nvGrpSpPr><p:grpSpPr><a:xfrm><a:off x="0" y="0"/><a:ext cx="0" cy="0"/><a:chOff x="0" y="0"/><a:chExt cx="0" cy="0"/></a:xfrm></p:grpSpPr><p:sp><p:nvSpPr><p:cNvPr id="2" name="Title 1"/><p:cNvSpPr><a:spLocks noGrp="1"/></p:cNvSpPr><p:nvPr><p:ph type="title"/></p:nvPr></p:nvSpPr><p:spPr/><p:txBody><a:bodyPr/><a:lstStyle/><a:p><a:r><a:t xml:space="preserve"><w:br/>[MARKER_OPENING 0:-ERR:REF-NOT-FOUND-]<w:br/>=andray()<w:br/>[MARKER_CLOSING 1:&lt;/a:t>&lt;/a:r>]<w:br/><w:br/>[MARKER_ISOLATED 2:-ERR:REF-NOT-FOUND-]<w:br/></a:t></a:r></a:p></p:txBody></p:sp><p:sp><p:nvSpPr><p:cNvPr id="3" name="Content Placeholder 2"/><p:cNvSpPr><a:spLocks noGrp="1"/></p:cNvSpPr><p:nvPr><p:ph idx="1"/></p:nvPr></p:nvSpPr><p:spPr/><p:txBody><a:bodyPr><a:normAutofit fontScale="70000" lnSpcReduction="20000"/></a:bodyPr><a:lstStyle/><a:p><a:r><a:t xml:space="preserve"><w:br/>[MARKER_OPENING 0:&lt;a:pPr>]<w:br/><w:br/>[MARKER_ISOLATED 1:&lt;a:buNone/>]<w:br/><w:br/>[MARKER_CLOSING 2:&lt;/a:pPr>]<w:br/><w:br/>[MARKER_OPENING 3:-ERR:REF-NOT-FOUND-]<w:br/>ethay uickqay <w:br/>[MARKER_CLOSING 4:&lt;/a:t>&lt;/a:r>]<w:br/><w:br/>[MARKER_OPENING 5:-ERR:REF-NOT-FOUND-]<w:br/>ownbray<w:br/>[MARKER_CLOSING 6:&lt;/a:t>&lt;/a:r>]<w:br/><w:br/>[MARKER_OPENING 7:-ERR:REF-NOT-FOUND-]<w:br/> oxfay <w:br/>[MARKER_CLOSING 8:&lt;/a:t>&lt;/a:r>]<w:br/><w:br/>[MARKER_OPENING 9:-ERR:REF-NOT-FOUND-]<w:br/>umpsjay<w:br/>[MARKER_CLOSING 10:&lt;/a:t>&lt;/a:r>]<w:br/><w:br/>[MARKER_OPENING 11:-ERR:REF-NOT-FOUND-]<w:br/> overhay ethay <w:br/>[MARKER_CLOSING 12:&lt;/a:t>&lt;/a:r>]<w:br/><w:br/>[MARKER_OPENING 13:-ERR:REF-NOT-FOUND-]<w:br/>azylay<w:br/>[MARKER_CLOSING 14:&lt;/a:t>&lt;/a:r>]<w:br/><w:br/>[MARKER_OPENING 15:-ERR:REF-NOT-FOUND-]<w:br/> ogday. ethay uickqay <w:br/>[MARKER_CLOSING 16:&lt;/a:t>&lt;/a:r>]<w:br/><w:br/>[MARKER_OPENING 17:-ERR:REF-NOT-FOUND-]<w:br/>ownbray<w:br/>[MARKER_CLOSING 18:&lt;/a:t>&lt;/a:r>]<w:br/><w:br/>[MARKER_OPENING 19:-ERR:REF-NOT-FOUND-]<w:br/> oxfay <w:br/>[MARKER_CLOSING 20:&lt;/a:t>&lt;/a:r>]<w:br/><w:br/>[MARKER_OPENING 21:-ERR:REF-NOT-FOUND-]<w:br/>umpsjay<w:br/>[MARKER_CLOSING 22:&lt;/a:t>&lt;/a:r>]<w:br/><w:br/>[MARKER_OPENING 23:-ERR:REF-NOT-FOUND-]<w:br/> overhay ethay <w:br/>[MARKER_CLOSING 24:&lt;/a:t>&lt;/a:r>]<w:br/><w:br/>[MARKER_OPENING 25:-ERR:REF-NOT-FOUND-]<w:br/>azylay<w:br/>[MARKER_CLOSING 26:&lt;/a:t>&lt;/a:r>]<w:br/><w:br/>[MARKER_OPENING 27:-ERR:REF-NOT-FOUND-]<w:br/> ogday. ethay uickqay <w:br/>[MARKER_CLOSING 28:&lt;/a:t>&lt;/a:r>]<w:br/><w:br/>[MARKER_OPENING 29:-ERR:REF-NOT-FOUND-]<w:br/>ownbray<w:br/>[MARKER_CLOSING 30:&lt;/a:t>&lt;/a:r>]<w:br/><w:br/>[MARKER_OPENING 31:-ERR:REF-NOT-FOUND-]<w:br/> oxfay <w:br/>[MARKER_CLOSING 32:&lt;/a:t>&lt;/a:r>]<w:br/><w:br/>[MARKER_OPENING 33:-ERR:REF-NOT-FOUND-]<w:br/>umpsjay<w:br/>[MARKER_CLOSING 34:&lt;/a:t>&lt;/a:r>]<w:br/><w:br/>[MARKER_OPENING 35:-ERR:REF-NOT-FOUND-]<w:br/> overhay ethay <w:br/>[MARKER_CLOSING 36:&lt;/a:t>&lt;/a:r>]<w:br/><w:br/>[MARKER_OPENING 37:-ERR:REF-NOT-FOUND-]<w:br/>azylay<w:br/>[MARKER_CLOSING 38:&lt;/a:t>&lt;/a:r>]<w:br/><w:br/>[MARKER_OPENING 39:-ERR:REF-NOT-FOUND-]<w:br/> ogday. ethay uickqay <w:br/>[MARKER_CLOSING 40:&lt;/a:t>&lt;/a:r>]<w:br/><w:br/>[MARKER_OPENING 41:-ERR:REF-NOT-FOUND-]<w:br/>ownbray<w:br/>[MARKER_CLOSING 42:&lt;/a:t>&lt;/a:r>]<w:br/><w:br/>[MARKER_OPENING 43:-ERR:REF-NOT-FOUND-]<w:br/> oxfay <w:br/>[MARKER_CLOSING 44:&lt;/a:t>&lt;/a:r>]<w:br/><w:br/>[MARKER_OPENING 45:-ERR:REF-NOT-FOUND-]<w:br/>umpsjay<w:br/>[MARKER_CLOSING 46:&lt;/a:t>&lt;/a:r>]<w:br/><w:br/>[MARKER_OPENING 47:-ERR:REF-NOT-FOUND-]<w:br/> overhay ethay <w:br/>[MARKER_CLOSING 48:&lt;/a:t>&lt;/a:r>]<w:br/><w:br/>[MARKER_OPENING 49:-ERR:REF-NOT-FOUND-]<w:br/>azylay<w:br/>[MARKER_CLOSING 50:&lt;/a:t>&lt;/a:r>]<w:br/><w:br/>[MARKER_OPENING 51:-ERR:REF-NOT-FOUND-]<w:br/> ogday. ethay uickqay <w:br/>[MARKER_CLOSING 52:&lt;/a:t>&lt;/a:r>]<w:br/><w:br/>[MARKER_OPENING 53:-ERR:REF-NOT-FOUND-]<w:br/>ownbray<w:br/>[MARKER_CLOSING 54:&lt;/a:t>&lt;/a:r>]<w:br/><w:br/>[MARKER_OPENING 55:-ERR:REF-NOT-FOUND-]<w:br/> oxfay <w:br/>[MARKER_CLOSING 56:&lt;/a:t>&lt;/a:r>]<w:br/><w:br/>[MARKER_OPENING 57:-ERR:REF-NOT-FOUND-]<w:br/>umpsjay<w:br/>[MARKER_CLOSING 58:&lt;/a:t>&lt;/a:r>]<w:br/><w:br/>[MARKER_OPENING 59:-ERR:REF-NOT-FOUND-]<w:br/> overhay ethay <w:br/>[MARKER_CLOSING 60:&lt;/a:t>&lt;/a:r>]<w:br/><w:br/>[MARKER_OPENING 61:-ERR:REF-NOT-FOUND-]<w:br/>azylay<w:br/>[MARKER_CLOSING 62:&lt;/a:t>&lt;/a:r>]<w:br/><w:br/>[MARKER_OPENING 63:-ERR:REF-NOT-FOUND-]<w:br/> ogday. <w:br/>[MARKER_CLOSING 64:&lt;/a:t>&lt;/a:r>]<w:br/><w:br/>[MARKER_OPENING 65:&lt;a:br>]<w:br/><w:br/>[MARKER_ISOLATED 66:-ERR:REF-NOT-FOUND-]<w:br/><w:br/>[MARKER_CLOSING 67:&lt;/a:br>]<w:br/><w:br/>[MARKER_ISOLATED 68:-ERR:REF-NOT-FOUND-]<w:br/><w:br/>[MARKER_OPENING 69:&lt;a:br>]<w:br/><w:br/>[MARKER_ISOLATED 70:-ERR:REF-NOT-FOUND-]<w:br/><w:br/>[MARKER_CLOSING 71:&lt;/a:br>]<w:br/><w:br/>[MARKER_OPENING 72:-ERR:REF-NOT-FOUND-]<w:br/>ethay uickqay <w:br/>[MARKER_CLOSING 73:&lt;/a:t>&lt;/a:r>]<w:br/><w:br/>[MARKER_OPENING 74:-ERR:REF-NOT-FOUND-]<w:br/>ownbray<w:br/>[MARKER_CLOSING 75:&lt;/a:t>&lt;/a:r>]<w:br/><w:br/>[MARKER_OPENING 76:-ERR:REF-NOT-FOUND-]<w:br/> oxfay <w:br/>[MARKER_CLOSING 77:&lt;/a:t>&lt;/a:r>]<w:br/><w:br/>[MARKER_OPENING 78:-ERR:REF-NOT-FOUND-]<w:br/>umpsjay<w:br/>[MARKER_CLOSING 79:&lt;/a:t>&lt;/a:r>]<w:br/><w:br/>[MARKER_OPENING 80:-ERR:REF-NOT-FOUND-]<w:br/> overhay ethay <w:br/>[MARKER_CLOSING 81:&lt;/a:t>&lt;/a:r>]<w:br/><w:br/>[MARKER_OPENING 82:-ERR:REF-NOT-FOUND-]<w:br/>azylay<w:br/>[MARKER_CLOSING 83:&lt;/a:t>&lt;/a:r>]<w:br/><w:br/>[MARKER_OPENING 84:-ERR:REF-NOT-FOUND-]<w:br/> ogday. ethay uickqay <w:br/>[MARKER_CLOSING 85:&lt;/a:t>&lt;/a:r>]<w:br/><w:br/>[MARKER_OPENING 86:-ERR:REF-NOT-FOUND-]<w:br/>ownbray<w:br/>[MARKER_CLOSING 87:&lt;/a:t>&lt;/a:r>]<w:br/><w:br/>[MARKER_OPENING 88:-ERR:REF-NOT-FOUND-]<w:br/> oxfay <w:br/>[MARKER_CLOSING 89:&lt;/a:t>&lt;/a:r>]<w:br/><w:br/>[MARKER_OPENING 90:-ERR:REF-NOT-FOUND-]<w:br/>umpsjay<w:br/>[MARKER_CLOSING 91:&lt;/a:t>&lt;/a:r>]<w:br/><w:br/>[MARKER_OPENING 92:-ERR:REF-NOT-FOUND-]<w:br/> overhay ethay <w:br/>[MARKER_CLOSING 93:&lt;/a:t>&lt;/a:r>]<w:br/><w:br/>[MARKER_OPENING 94:-ERR:REF-NOT-FOUND-]<w:br/>azylay<w:br/>[MARKER_CLOSING 95:&lt;/a:t>&lt;/a:r>]<w:br/><w:br/>[MARKER_OPENING 96:-ERR:REF-NOT-FOUND-]<w:br/> ogday. ethay uickqay <w:br/>[MARKER_CLOSING 97:&lt;/a:t>&lt;/a:r>]<w:br/><w:br/>[MARKER_OPENING 98:-ERR:REF-NOT-FOUND-]<w:br/>ownbray<w:br/>[MARKER_CLOSING 99:&lt;/a:t>&lt;/a:r>]<w:br/><w:br/>[MARKER_OPENING 100:-ERR:REF-NOT-FOUND-]<w:br/> oxfay <w:br/>[MARKER_CLOSING 101:&lt;/a:t>&lt;/a:r>]<w:br/><w:br/>[MARKER_OPENING 102:-ERR:REF-NOT-FOUND-]<w:br/>umpsjay<w:br/>[MARKER_CLOSING 103:&lt;/a:t>&lt;/a:r>]<w:br/><w:br/>[MARKER_OPENING 104:-ERR:REF-NOT-FOUND-]<w:br/> overhay ethay <w:br/>[MARKER_CLOSING 105:&lt;/a:t>&lt;/a:r>]<w:br/><w:br/>[MARKER_OPENING 106:-ERR:REF-NOT-FOUND-]<w:br/>azylay<w:br/>[MARKER_CLOSING 107:&lt;/a:t>&lt;/a:r>]<w:br/><w:br/>[MARKER_OPENING 108:-ERR:REF-NOT-FOUND-]<w:br/> ogday. ethay uickqay <w:br/>[MARKER_CLOSING 109:&lt;/a:t>&lt;/a:r>]<w:br/><w:br/>[MARKER_OPENING 110:-ERR:REF-NOT-FOUND-]<w:br/>ownbray<w:br/>[MARKER_CLOSING 111:&lt;/a:t>&lt;/a:r>]<w:br/><w:br/>[MARKER_OPENING 112:-ERR:REF-NOT-FOUND-]<w:br/> oxfay <w:br/>[MARKER_CLOSING 113:&lt;/a:t>&lt;/a:r>]<w:br/><w:br/>[MARKER_OPENING 114:-ERR:REF-NOT-FOUND-]<w:br/>umpsjay<w:br/>[MARKER_CLOSING 115:&lt;/a:t>&lt;/a:r>]<w:br/><w:br/>[MARKER_OPENING 116:-ERR:REF-NOT-FOUND-]<w:br/> overhay ethay <w:br/>[MARKER_CLOSING 117:&lt;/a:t>&lt;/a:r>]<w:br/><w:br/>[MARKER_OPENING 118:-ERR:REF-NOT-FOUND-]<w:br/>azylay<w:br/>[MARKER_CLOSING 119:&lt;/a:t>&lt;/a:r>]<w:br/><w:br/>[MARKER_OPENING 120:-ERR:REF-NOT-FOUND-]<w:br/> ogday. ethay uickqay <w:br/>[MARKER_CLOSING 121:&lt;/a:t>&lt;/a:r>]<w:br/><w:br/>[MARKER_OPENING 122:-ERR:REF-NOT-FOUND-]<w:br/>ownbray<w:br/>[MARKER_CLOSING 123:&lt;/a:t>&lt;/a:r>]<w:br/><w:br/>[MARKER_OPENING 124:-ERR:REF-NOT-FOUND-]<w:br/> oxfay <w:br/>[MARKER_CLOSING 125:&lt;/a:t>&lt;/a:r>]<w:br/><w:br/>[MARKER_OPENING 126:-ERR:REF-NOT-FOUND-]<w:br/>umpsjay<w:br/>[MARKER_CLOSING 127:&lt;/a:t>&lt;/a:r>]<w:br/><w:br/>[MARKER_OPENING 128:-ERR:REF-NOT-FOUND-]<w:br/> overhay ethay <w:br/>[MARKER_CLOSING 129:&lt;/a:t>&lt;/a:r>]<w:br/><w:br/>[MARKER_OPENING 130:-ERR:REF-NOT-FOUND-]<w:br/>azylay<w:br/>[MARKER_CLOSING 131:&lt;/a:t>&lt;/a:r>]<w:br/><w:br/>[MARKER_OPENING 132:-ERR:REF-NOT-FOUND-]<w:br/> ogday. <w:br/>[MARKER_CLOSING 133:&lt;/a:t>&lt;/a:r>]<w:br/><w:br/>[MARKER_OPENING 134:&lt;a:br>]<w:br/><w:br/>[MARKER_ISOLATED 135:-ERR:REF-NOT-FOUND-]<w:br/><w:br/>[MARKER_CLOSING 136:&lt;/a:br>]<w:br/><w:br/>[MARKER_ISOLATED 137:-ERR:REF-NOT-FOUND-]<w:br/><w:br/>[MARKER_OPENING 138:&lt;a:br>]<w:br/><w:br/>[MARKER_ISOLATED 139:-ERR:REF-NOT-FOUND-]<w:br/><w:br/>[MARKER_CLOSING 140:&lt;/a:br>]<w:br/><w:br/>[MARKER_OPENING 141:-ERR:REF-NOT-FOUND-]<w:br/>ethay uickqay <w:br/>[MARKER_CLOSING 142:&lt;/a:t>&lt;/a:r>]<w:br/><w:br/>[MARKER_OPENING 143:-ERR:REF-NOT-FOUND-]<w:br/>ownbray<w:br/>[MARKER_CLOSING 144:&lt;/a:t>&lt;/a:r>]<w:br/><w:br/>[MARKER_OPENING 145:-ERR:REF-NOT-FOUND-]<w:br/> oxfay <w:br/>[MARKER_CLOSING 146:&lt;/a:t>&lt;/a:r>]<w:br/><w:br/>[MARKER_OPENING 147:-ERR:REF-NOT-FOUND-]<w:br/>umpsjay<w:br/>[MARKER_CLOSING 148:&lt;/a:t>&lt;/a:r>]<w:br/><w:br/>[MARKER_OPENING 149:-ERR:REF-NOT-FOUND-]<w:br/> overhay ethay <w:br/>[MARKER_CLOSING 150:&lt;/a:t>&lt;/a:r>]<w:br/><w:br/>[MARKER_OPENING 151:-ERR:REF-NOT-FOUND-]<w:br/>azylay<w:br/>[MARKER_CLOSING 152:&lt;/a:t>&lt;/a:r>]<w:br/><w:br/>[MARKER_OPENING 153:-ERR:REF-NOT-FOUND-]<w:br/> ogday. ethay uickqay <w:br/>[MARKER_CLOSING 154:&lt;/a:t>&lt;/a:r>]<w:br/><w:br/>[MARKER_OPENING 155:-ERR:REF-NOT-FOUND-]<w:br/>ownbray<w:br/>[MARKER_CLOSING 156:&lt;/a:t>&lt;/a:r>]<w:br/><w:br/>[MARKER_OPENING 157:-ERR:REF-NOT-FOUND-]<w:br/> oxfay <w:br/>[MARKER_CLOSING 158:&lt;/a:t>&lt;/a:r>]<w:br/><w:br/>[MARKER_OPENING 159:-ERR:REF-NOT-FOUND-]<w:br/>umpsjay<w:br/>[MARKER_CLOSING 160:&lt;/a:t>&lt;/a:r>]<w:br/><w:br/>[MARKER_OPENING 161:-ERR:REF-NOT-FOUND-]<w:br/> overhay ethay <w:br/>[MARKER_CLOSING 162:&lt;/a:t>&lt;/a:r>]<w:br/><w:br/>[MARKER_OPENING 163:-ERR:REF-NOT-FOUND-]<w:br/>azylay<w:br/>[MARKER_CLOSING 164:&lt;/a:t>&lt;/a:r>]<w:br/><w:br/>[MARKER_OPENING 165:-ERR:REF-NOT-FOUND-]<w:br/> ogday. ethay uickqay <w:br/>[MARKER_CLOSING 166:&lt;/a:t>&lt;/a:r>]<w:br/><w:br/>[MARKER_OPENING 167:-ERR:REF-NOT-FOUND-]<w:br/>ownbray<w:br/>[MARKER_CLOSING 168:&lt;/a:t>&lt;/a:r>]<w:br/><w:br/>[MARKER_OPENING 169:-ERR:REF-NOT-FOUND-]<w:br/> oxfay <w:br/>[MARKER_CLOSING 170:&lt;/a:t>&lt;/a:r>]<w:br/><w:br/>[MARKER_OPENING 171:-ERR:REF-NOT-FOUND-]<w:br/>umpsjay<w:br/>[MARKER_CLOSING 172:&lt;/a:t>&lt;/a:r>]<w:br/><w:br/>[MARKER_OPENING 173:-ERR:REF-NOT-FOUND-]<w:br/> overhay ethay <w:br/>[MARKER_CLOSING 174:&lt;/a:t>&lt;/a:r>]<w:br/><w:br/>[MARKER_OPENING 175:-ERR:REF-NOT-FOUND-]<w:br/>azylay<w:br/>[MARKER_CLOSING 176:&lt;/a:t>&lt;/a:r>]<w:br/><w:br/>[MARKER_OPENING 177:-ERR:REF-NOT-FOUND-]<w:br/> ogday. ethay uickqay <w:br/>[MARKER_CLOSING 178:&lt;/a:t>&lt;/a:r>]<w:br/><w:br/>[MARKER_OPENING 179:-ERR:REF-NOT-FOUND-]<w:br/>ownbray<w:br/>[MARKER_CLOSING 180:&lt;/a:t>&lt;/a:r>]<w:br/><w:br/>[MARKER_OPENING 181:-ERR:REF-NOT-FOUND-]<w:br/> oxfay <w:br/>[MARKER_CLOSING 182:&lt;/a:t>&lt;/a:r>]<w:br/><w:br/>[MARKER_OPENING 183:-ERR:REF-NOT-FOUND-]<w:br/>umpsjay<w:br/>[MARKER_CLOSING 184:&lt;/a:t>&lt;/a:r>]<w:br/><w:br/>[MARKER_OPENING 185:-ERR:REF-NOT-FOUND-]<w:br/> overhay ethay <w:br/>[MARKER_CLOSING 186:&lt;/a:t>&lt;/a:r>]<w:br/><w:br/>[MARKER_OPENING 187:-ERR:REF-NOT-FOUND-]<w:br/>azylay<w:br/>[MARKER_CLOSING 188:&lt;/a:t>&lt;/a:r>]<w:br/><w:br/>[MARKER_OPENING 189:-ERR:REF-NOT-FOUND-]<w:br/> ogday. ethay uickqay <w:br/>[MARKER_CLOSING 190:&lt;/a:t>&lt;/a:r>]<w:br/><w:br/>[MARKER_OPENING 191:-ERR:REF-NOT-FOUND-]<w:br/>ownbray<w:br/>[MARKER_CLOSING 192:&lt;/a:t>&lt;/a:r>]<w:br/><w:br/>[MARKER_OPENING 193:-ERR:REF-NOT-FOUND-]<w:br/> oxfay <w:br/>[MARKER_CLOSING 194:&lt;/a:t>&lt;/a:r>]<w:br/><w:br/>[MARKER_OPENING 195:-ERR:REF-NOT-FOUND-]<w:br/>umpsjay<w:br/>[MARKER_CLOSING 196:&lt;/a:t>&lt;/a:r>]<w:br/><w:br/>[MARKER_OPENING 197:-ERR:REF-NOT-FOUND-]<w:br/> overhay ethay <w:br/>[MARKER_CLOSING 198:&lt;/a:t>&lt;/a:r>]<w:br/><w:br/>[MARKER_OPENING 199:-ERR:REF-NOT-FOUND-]<w:br/>azylay<w:br/>[MARKER_CLOSING 200:&lt;/a:t>&lt;/a:r>]<w:br/><w:br/>[MARKER_OPENING 201:-ERR:REF-NOT-FOUND-]<w:br/> ogday. <w:br/>[MARKER_CLOSING 202:&lt;/a:t>&lt;/a:r>]<w:br/><w:br/>[MARKER_OPENING 203:&lt;a:br>]<w:br/><w:br/>[MARKER_ISOLATED 204:-ERR:REF-NOT-FOUND-]<w:br/><w:br/>[MARKER_CLOSING 205:&lt;/a:br>]<w:br/><w:br/>[MARKER_ISOLATED 206:-ERR:REF-NOT-FOUND-]<w:br/></a:t></a:r></a:p></p:txBody></p:sp></p:spTree></p:cSld><p:clrMapOvr><a:masterClrMapping/></p:clrMapOvr></p:sld>
+<file path=ppt/slides/slide1.xml><?xml version="1.0" encoding="utf-8"?>
+<p:sld xmlns:a="http://schemas.openxmlformats.org/drawingml/2006/main" xmlns:r="http://schemas.openxmlformats.org/officeDocument/2006/relationships" xmlns:p="http://schemas.openxmlformats.org/presentationml/2006/main">
+  <p:cSld>
+    <p:spTree>
+      <p:nvGrpSpPr>
+        <p:cNvPr id="1" name=""/>
+        <p:cNvGrpSpPr/>
+        <p:nvPr/>
+      </p:nvGrpSpPr>
+      <p:grpSpPr>
+        <a:xfrm>
+          <a:off x="0" y="0"/>
+          <a:ext cx="0" cy="0"/>
+          <a:chOff x="0" y="0"/>
+          <a:chExt cx="0" cy="0"/>
+        </a:xfrm>
+      </p:grpSpPr>
+      <p:sp>
+        <p:nvSpPr>
+          <p:cNvPr id="2" name="Title 1"/>
+          <p:cNvSpPr>
+            <a:spLocks noGrp="1"/>
+          </p:cNvSpPr>
+          <p:nvPr>
+            <p:ph type="title"/>
+          </p:nvPr>
+        </p:nvSpPr>
+        <p:spPr/>
+        <p:txBody>
+          <a:bodyPr/>
+          <a:lstStyle/>
+          <a:p>
+            <a:r>
+              <a:rPr lang="fr-FR" dirty="0" smtClean="0"/>
+              <a:t>[MARKER_OPENING 0 -ERR:REF-NOT-FOUND-]   =andray()[MARKER_CLOSING 1 &lt;/a:t&gt;&lt;/a:r&gt;]   </a:t>
+            </a:r>
+            <a:endParaRPr lang="fr-FR" dirty="0"/>
+          </a:p>
+        </p:txBody>
+      </p:sp>
+      <p:sp>
+        <p:nvSpPr>
+          <p:cNvPr id="3" name="Content Placeholder 2"/>
+          <p:cNvSpPr>
+            <a:spLocks noGrp="1"/>
+          </p:cNvSpPr>
+          <p:nvPr>
+            <p:ph idx="1"/>
+          </p:nvPr>
+        </p:nvSpPr>
+        <p:spPr/>
+        <p:txBody>
+          <a:bodyPr>
+            <a:normAutofit fontScale="70000" lnSpcReduction="20000"/>
+          </a:bodyPr>
+          <a:lstStyle/>
+          <a:p>
+            <a:pPr>
+              <a:buNone/>
+            </a:pPr>
+            <a:r>
+              <a:rPr lang="fr-FR" dirty="0" smtClean="0"/>
+              <a:t>[MARKER_OPENING 0 -ERR:REF-NOT-FOUND-]   ethay uickqay [MARKER_CLOSING 1 &lt;/a:t&gt;&lt;/a:r&gt;]   </a:t>
+            </a:r>
+            <a:r>
+              <a:rPr lang="fr-FR" dirty="0" err="1" smtClean="0"/>
+              <a:t>[MARKER_OPENING 2 -ERR:REF-NOT-FOUND-]   ownbray[MARKER_CLOSING 3 &lt;/a:t&gt;&lt;/a:r&gt;]   </a:t>
+            </a:r>
+            <a:r>
+              <a:rPr lang="fr-FR" dirty="0" smtClean="0"/>
+              <a:t>[MARKER_OPENING 4 -ERR:REF-NOT-FOUND-]    oxfay [MARKER_CLOSING 5 &lt;/a:t&gt;&lt;/a:r&gt;]   </a:t>
+            </a:r>
+            <a:r>
+              <a:rPr lang="fr-FR" dirty="0" err="1" smtClean="0"/>
+              <a:t>[MARKER_OPENING 6 -ERR:REF-NOT-FOUND-]   umpsjay[MARKER_CLOSING 7 &lt;/a:t&gt;&lt;/a:r&gt;]   </a:t>
+            </a:r>
+            <a:r>
+              <a:rPr lang="fr-FR" dirty="0" smtClean="0"/>
+              <a:t>[MARKER_OPENING 8 -ERR:REF-NOT-FOUND-]    overhay ethay [MARKER_CLOSING 9 &lt;/a:t&gt;&lt;/a:r&gt;]   </a:t>
+            </a:r>
+            <a:r>
+              <a:rPr lang="fr-FR" dirty="0" err="1" smtClean="0"/>
+              <a:t>[MARKER_OPENING 10 -ERR:REF-NOT-FOUND-]   azylay[MARKER_CLOSING 11 &lt;/a:t&gt;&lt;/a:r&gt;]   </a:t>
+            </a:r>
+            <a:r>
+              <a:rPr lang="fr-FR" dirty="0" smtClean="0"/>
+              <a:t>[MARKER_OPENING 12 -ERR:REF-NOT-FOUND-]    ogday. ethay uickqay [MARKER_CLOSING 13 &lt;/a:t&gt;&lt;/a:r&gt;]   </a:t>
+            </a:r>
+            <a:r>
+              <a:rPr lang="fr-FR" dirty="0" err="1" smtClean="0"/>
+              <a:t>[MARKER_OPENING 14 -ERR:REF-NOT-FOUND-]   ownbray[MARKER_CLOSING 15 &lt;/a:t&gt;&lt;/a:r&gt;]   </a:t>
+            </a:r>
+            <a:r>
+              <a:rPr lang="fr-FR" dirty="0" smtClean="0"/>
+              <a:t>[MARKER_OPENING 16 -ERR:REF-NOT-FOUND-]    oxfay [MARKER_CLOSING 17 &lt;/a:t&gt;&lt;/a:r&gt;]   </a:t>
+            </a:r>
+            <a:r>
+              <a:rPr lang="fr-FR" dirty="0" err="1" smtClean="0"/>
+              <a:t>[MARKER_OPENING 18 -ERR:REF-NOT-FOUND-]   umpsjay[MARKER_CLOSING 19 &lt;/a:t&gt;&lt;/a:r&gt;]   </a:t>
+            </a:r>
+            <a:r>
+              <a:rPr lang="fr-FR" dirty="0" smtClean="0"/>
+              <a:t>[MARKER_OPENING 20 -ERR:REF-NOT-FOUND-]    overhay ethay [MARKER_CLOSING 21 &lt;/a:t&gt;&lt;/a:r&gt;]   </a:t>
+            </a:r>
+            <a:r>
+              <a:rPr lang="fr-FR" dirty="0" err="1" smtClean="0"/>
+              <a:t>[MARKER_OPENING 22 -ERR:REF-NOT-FOUND-]   azylay[MARKER_CLOSING 23 &lt;/a:t&gt;&lt;/a:r&gt;]   </a:t>
+            </a:r>
+            <a:r>
+              <a:rPr lang="fr-FR" dirty="0" smtClean="0"/>
+              <a:t>[MARKER_OPENING 24 -ERR:REF-NOT-FOUND-]    ogday. ethay uickqay [MARKER_CLOSING 25 &lt;/a:t&gt;&lt;/a:r&gt;]   </a:t>
+            </a:r>
+            <a:r>
+              <a:rPr lang="fr-FR" dirty="0" err="1" smtClean="0"/>
+              <a:t>[MARKER_OPENING 26 -ERR:REF-NOT-FOUND-]   ownbray[MARKER_CLOSING 27 &lt;/a:t&gt;&lt;/a:r&gt;]   </a:t>
+            </a:r>
+            <a:r>
+              <a:rPr lang="fr-FR" dirty="0" smtClean="0"/>
+              <a:t>[MARKER_OPENING 28 -ERR:REF-NOT-FOUND-]    oxfay [MARKER_CLOSING 29 &lt;/a:t&gt;&lt;/a:r&gt;]   </a:t>
+            </a:r>
+            <a:r>
+              <a:rPr lang="fr-FR" dirty="0" err="1" smtClean="0"/>
+              <a:t>[MARKER_OPENING 30 -ERR:REF-NOT-FOUND-]   umpsjay[MARKER_CLOSING 31 &lt;/a:t&gt;&lt;/a:r&gt;]   </a:t>
+            </a:r>
+            <a:r>
+              <a:rPr lang="fr-FR" dirty="0" smtClean="0"/>
+              <a:t>[MARKER_OPENING 32 -ERR:REF-NOT-FOUND-]    overhay ethay [MARKER_CLOSING 33 &lt;/a:t&gt;&lt;/a:r&gt;]   </a:t>
+            </a:r>
+            <a:r>
+              <a:rPr lang="fr-FR" dirty="0" err="1" smtClean="0"/>
+              <a:t>[MARKER_OPENING 34 -ERR:REF-NOT-FOUND-]   azylay[MARKER_CLOSING 35 &lt;/a:t&gt;&lt;/a:r&gt;]   </a:t>
+            </a:r>
+            <a:r>
+              <a:rPr lang="fr-FR" dirty="0" smtClean="0"/>
+              <a:t>[MARKER_OPENING 36 -ERR:REF-NOT-FOUND-]    ogday. ethay uickqay [MARKER_CLOSING 37 &lt;/a:t&gt;&lt;/a:r&gt;]   </a:t>
+            </a:r>
+            <a:r>
+              <a:rPr lang="fr-FR" dirty="0" err="1" smtClean="0"/>
+              <a:t>[MARKER_OPENING 38 -ERR:REF-NOT-FOUND-]   ownbray[MARKER_CLOSING 39 &lt;/a:t&gt;&lt;/a:r&gt;]   </a:t>
+            </a:r>
+            <a:r>
+              <a:rPr lang="fr-FR" dirty="0" smtClean="0"/>
+              <a:t>[MARKER_OPENING 40 -ERR:REF-NOT-FOUND-]    oxfay [MARKER_CLOSING 41 &lt;/a:t&gt;&lt;/a:r&gt;]   </a:t>
+            </a:r>
+            <a:r>
+              <a:rPr lang="fr-FR" dirty="0" err="1" smtClean="0"/>
+              <a:t>[MARKER_OPENING 42 -ERR:REF-NOT-FOUND-]   umpsjay[MARKER_CLOSING 43 &lt;/a:t&gt;&lt;/a:r&gt;]   </a:t>
+            </a:r>
+            <a:r>
+              <a:rPr lang="fr-FR" dirty="0" smtClean="0"/>
+              <a:t>[MARKER_OPENING 44 -ERR:REF-NOT-FOUND-]    overhay ethay [MARKER_CLOSING 45 &lt;/a:t&gt;&lt;/a:r&gt;]   </a:t>
+            </a:r>
+            <a:r>
+              <a:rPr lang="fr-FR" dirty="0" err="1" smtClean="0"/>
+              <a:t>[MARKER_OPENING 46 -ERR:REF-NOT-FOUND-]   azylay[MARKER_CLOSING 47 &lt;/a:t&gt;&lt;/a:r&gt;]   </a:t>
+            </a:r>
+            <a:r>
+              <a:rPr lang="fr-FR" dirty="0" smtClean="0"/>
+              <a:t>[MARKER_OPENING 48 -ERR:REF-NOT-FOUND-]    ogday. ethay uickqay [MARKER_CLOSING 49 &lt;/a:t&gt;&lt;/a:r&gt;]   </a:t>
+            </a:r>
+            <a:r>
+              <a:rPr lang="fr-FR" dirty="0" err="1" smtClean="0"/>
+              <a:t>[MARKER_OPENING 50 -ERR:REF-NOT-FOUND-]   ownbray[MARKER_CLOSING 51 &lt;/a:t&gt;&lt;/a:r&gt;]   </a:t>
+            </a:r>
+            <a:r>
+              <a:rPr lang="fr-FR" dirty="0" smtClean="0"/>
+              <a:t>[MARKER_OPENING 52 -ERR:REF-NOT-FOUND-]    oxfay [MARKER_CLOSING 53 &lt;/a:t&gt;&lt;/a:r&gt;]   </a:t>
+            </a:r>
+            <a:r>
+              <a:rPr lang="fr-FR" dirty="0" err="1" smtClean="0"/>
+              <a:t>[MARKER_OPENING 54 -ERR:REF-NOT-FOUND-]   umpsjay[MARKER_CLOSING 55 &lt;/a:t&gt;&lt;/a:r&gt;]   </a:t>
+            </a:r>
+            <a:r>
+              <a:rPr lang="fr-FR" dirty="0" smtClean="0"/>
+              <a:t>[MARKER_OPENING 56 -ERR:REF-NOT-FOUND-]    overhay ethay [MARKER_CLOSING 57 &lt;/a:t&gt;&lt;/a:r&gt;]   </a:t>
+            </a:r>
+            <a:r>
+              <a:rPr lang="fr-FR" dirty="0" err="1" smtClean="0"/>
+              <a:t>[MARKER_OPENING 58 -ERR:REF-NOT-FOUND-]   azylay[MARKER_CLOSING 59 &lt;/a:t&gt;&lt;/a:r&gt;]   </a:t>
+            </a:r>
+            <a:r>
+              <a:rPr lang="fr-FR" dirty="0" smtClean="0"/>
+              <a:t>[MARKER_OPENING 60 -ERR:REF-NOT-FOUND-]    ogday. [MARKER_CLOSING 61 &lt;/a:t&gt;&lt;/a:r&gt;]   </a:t>
+            </a:r>
+            <a:br>
+              <a:rPr lang="fr-FR" dirty="0" smtClean="0"/>
+            </a:br>
+            <a:r>
+              <a:rPr lang="fr-FR" dirty="0" smtClean="0"/>
+              <a:t/>
+            </a:r>
+            <a:br>
+              <a:rPr lang="fr-FR" dirty="0" smtClean="0"/>
+            </a:br>
+            <a:r>
+              <a:rPr lang="fr-FR" dirty="0" smtClean="0"/>
+              <a:t>[MARKER_OPENING 65 -ERR:REF-NOT-FOUND-]   ethay uickqay [MARKER_CLOSING 66 &lt;/a:t&gt;&lt;/a:r&gt;]   </a:t>
+            </a:r>
+            <a:r>
+              <a:rPr lang="fr-FR" dirty="0" err="1" smtClean="0"/>
+              <a:t>[MARKER_OPENING 67 -ERR:REF-NOT-FOUND-]   ownbray[MARKER_CLOSING 68 &lt;/a:t&gt;&lt;/a:r&gt;]   </a:t>
+            </a:r>
+            <a:r>
+              <a:rPr lang="fr-FR" dirty="0" smtClean="0"/>
+              <a:t>[MARKER_OPENING 69 -ERR:REF-NOT-FOUND-]    oxfay [MARKER_CLOSING 70 &lt;/a:t&gt;&lt;/a:r&gt;]   </a:t>
+            </a:r>
+            <a:r>
+              <a:rPr lang="fr-FR" dirty="0" err="1" smtClean="0"/>
+              <a:t>[MARKER_OPENING 71 -ERR:REF-NOT-FOUND-]   umpsjay[MARKER_CLOSING 72 &lt;/a:t&gt;&lt;/a:r&gt;]   </a:t>
+            </a:r>
+            <a:r>
+              <a:rPr lang="fr-FR" dirty="0" smtClean="0"/>
+              <a:t>[MARKER_OPENING 73 -ERR:REF-NOT-FOUND-]    overhay ethay [MARKER_CLOSING 74 &lt;/a:t&gt;&lt;/a:r&gt;]   </a:t>
+            </a:r>
+            <a:r>
+              <a:rPr lang="fr-FR" dirty="0" err="1" smtClean="0"/>
+              <a:t>[MARKER_OPENING 75 -ERR:REF-NOT-FOUND-]   azylay[MARKER_CLOSING 76 &lt;/a:t&gt;&lt;/a:r&gt;]   </a:t>
+            </a:r>
+            <a:r>
+              <a:rPr lang="fr-FR" dirty="0" smtClean="0"/>
+              <a:t>[MARKER_OPENING 77 -ERR:REF-NOT-FOUND-]    ogday. ethay uickqay [MARKER_CLOSING 78 &lt;/a:t&gt;&lt;/a:r&gt;]   </a:t>
+            </a:r>
+            <a:r>
+              <a:rPr lang="fr-FR" dirty="0" err="1" smtClean="0"/>
+              <a:t>[MARKER_OPENING 79 -ERR:REF-NOT-FOUND-]   ownbray[MARKER_CLOSING 80 &lt;/a:t&gt;&lt;/a:r&gt;]   </a:t>
+            </a:r>
+            <a:r>
+              <a:rPr lang="fr-FR" dirty="0" smtClean="0"/>
+              <a:t>[MARKER_OPENING 81 -ERR:REF-NOT-FOUND-]    oxfay [MARKER_CLOSING 82 &lt;/a:t&gt;&lt;/a:r&gt;]   </a:t>
+            </a:r>
+            <a:r>
+              <a:rPr lang="fr-FR" dirty="0" err="1" smtClean="0"/>
+              <a:t>[MARKER_OPENING 83 -ERR:REF-NOT-FOUND-]   umpsjay[MARKER_CLOSING 84 &lt;/a:t&gt;&lt;/a:r&gt;]   </a:t>
+            </a:r>
+            <a:r>
+              <a:rPr lang="fr-FR" dirty="0" smtClean="0"/>
+              <a:t>[MARKER_OPENING 85 -ERR:REF-NOT-FOUND-]    overhay ethay [MARKER_CLOSING 86 &lt;/a:t&gt;&lt;/a:r&gt;]   </a:t>
+            </a:r>
+            <a:r>
+              <a:rPr lang="fr-FR" dirty="0" err="1" smtClean="0"/>
+              <a:t>[MARKER_OPENING 87 -ERR:REF-NOT-FOUND-]   azylay[MARKER_CLOSING 88 &lt;/a:t&gt;&lt;/a:r&gt;]   </a:t>
+            </a:r>
+            <a:r>
+              <a:rPr lang="fr-FR" dirty="0" smtClean="0"/>
+              <a:t>[MARKER_OPENING 89 -ERR:REF-NOT-FOUND-]    ogday. ethay uickqay [MARKER_CLOSING 90 &lt;/a:t&gt;&lt;/a:r&gt;]   </a:t>
+            </a:r>
+            <a:r>
+              <a:rPr lang="fr-FR" dirty="0" err="1" smtClean="0"/>
+              <a:t>[MARKER_OPENING 91 -ERR:REF-NOT-FOUND-]   ownbray[MARKER_CLOSING 92 &lt;/a:t&gt;&lt;/a:r&gt;]   </a:t>
+            </a:r>
+            <a:r>
+              <a:rPr lang="fr-FR" dirty="0" smtClean="0"/>
+              <a:t>[MARKER_OPENING 93 -ERR:REF-NOT-FOUND-]    oxfay [MARKER_CLOSING 94 &lt;/a:t&gt;&lt;/a:r&gt;]   </a:t>
+            </a:r>
+            <a:r>
+              <a:rPr lang="fr-FR" dirty="0" err="1" smtClean="0"/>
+              <a:t>[MARKER_OPENING 95 -ERR:REF-NOT-FOUND-]   umpsjay[MARKER_CLOSING 96 &lt;/a:t&gt;&lt;/a:r&gt;]   </a:t>
+            </a:r>
+            <a:r>
+              <a:rPr lang="fr-FR" dirty="0" smtClean="0"/>
+              <a:t>[MARKER_OPENING 97 -ERR:REF-NOT-FOUND-]    overhay ethay [MARKER_CLOSING 98 &lt;/a:t&gt;&lt;/a:r&gt;]   </a:t>
+            </a:r>
+            <a:r>
+              <a:rPr lang="fr-FR" dirty="0" err="1" smtClean="0"/>
+              <a:t>[MARKER_OPENING 99 -ERR:REF-NOT-FOUND-]   azylay[MARKER_CLOSING 100 &lt;/a:t&gt;&lt;/a:r&gt;]   </a:t>
+            </a:r>
+            <a:r>
+              <a:rPr lang="fr-FR" dirty="0" smtClean="0"/>
+              <a:t>[MARKER_OPENING 101 -ERR:REF-NOT-FOUND-]    ogday. ethay uickqay [MARKER_CLOSING 102 &lt;/a:t&gt;&lt;/a:r&gt;]   </a:t>
+            </a:r>
+            <a:r>
+              <a:rPr lang="fr-FR" dirty="0" err="1" smtClean="0"/>
+              <a:t>[MARKER_OPENING 103 -ERR:REF-NOT-FOUND-]   ownbray[MARKER_CLOSING 104 &lt;/a:t&gt;&lt;/a:r&gt;]   </a:t>
+            </a:r>
+            <a:r>
+              <a:rPr lang="fr-FR" dirty="0" smtClean="0"/>
+              <a:t>[MARKER_OPENING 105 -ERR:REF-NOT-FOUND-]    oxfay [MARKER_CLOSING 106 &lt;/a:t&gt;&lt;/a:r&gt;]   </a:t>
+            </a:r>
+            <a:r>
+              <a:rPr lang="fr-FR" dirty="0" err="1" smtClean="0"/>
+              <a:t>[MARKER_OPENING 107 -ERR:REF-NOT-FOUND-]   umpsjay[MARKER_CLOSING 108 &lt;/a:t&gt;&lt;/a:r&gt;]   </a:t>
+            </a:r>
+            <a:r>
+              <a:rPr lang="fr-FR" dirty="0" smtClean="0"/>
+              <a:t>[MARKER_OPENING 109 -ERR:REF-NOT-FOUND-]    overhay ethay [MARKER_CLOSING 110 &lt;/a:t&gt;&lt;/a:r&gt;]   </a:t>
+            </a:r>
+            <a:r>
+              <a:rPr lang="fr-FR" dirty="0" err="1" smtClean="0"/>
+              <a:t>[MARKER_OPENING 111 -ERR:REF-NOT-FOUND-]   azylay[MARKER_CLOSING 112 &lt;/a:t&gt;&lt;/a:r&gt;]   </a:t>
+            </a:r>
+            <a:r>
+              <a:rPr lang="fr-FR" dirty="0" smtClean="0"/>
+              <a:t>[MARKER_OPENING 113 -ERR:REF-NOT-FOUND-]    ogday. ethay uickqay [MARKER_CLOSING 114 &lt;/a:t&gt;&lt;/a:r&gt;]   </a:t>
+            </a:r>
+            <a:r>
+              <a:rPr lang="fr-FR" dirty="0" err="1" smtClean="0"/>
+              <a:t>[MARKER_OPENING 115 -ERR:REF-NOT-FOUND-]   ownbray[MARKER_CLOSING 116 &lt;/a:t&gt;&lt;/a:r&gt;]   </a:t>
+            </a:r>
+            <a:r>
+              <a:rPr lang="fr-FR" dirty="0" smtClean="0"/>
+              <a:t>[MARKER_OPENING 117 -ERR:REF-NOT-FOUND-]    oxfay [MARKER_CLOSING 118 &lt;/a:t&gt;&lt;/a:r&gt;]   </a:t>
+            </a:r>
+            <a:r>
+              <a:rPr lang="fr-FR" dirty="0" err="1" smtClean="0"/>
+              <a:t>[MARKER_OPENING 119 -ERR:REF-NOT-FOUND-]   umpsjay[MARKER_CLOSING 120 &lt;/a:t&gt;&lt;/a:r&gt;]   </a:t>
+            </a:r>
+            <a:r>
+              <a:rPr lang="fr-FR" dirty="0" smtClean="0"/>
+              <a:t>[MARKER_OPENING 121 -ERR:REF-NOT-FOUND-]    overhay ethay [MARKER_CLOSING 122 &lt;/a:t&gt;&lt;/a:r&gt;]   </a:t>
+            </a:r>
+            <a:r>
+              <a:rPr lang="fr-FR" dirty="0" err="1" smtClean="0"/>
+              <a:t>[MARKER_OPENING 123 -ERR:REF-NOT-FOUND-]   azylay[MARKER_CLOSING 124 &lt;/a:t&gt;&lt;/a:r&gt;]   </a:t>
+            </a:r>
+            <a:r>
+              <a:rPr lang="fr-FR" dirty="0" smtClean="0"/>
+              <a:t>[MARKER_OPENING 125 -ERR:REF-NOT-FOUND-]    ogday. [MARKER_CLOSING 126 &lt;/a:t&gt;&lt;/a:r&gt;]   </a:t>
+            </a:r>
+            <a:br>
+              <a:rPr lang="fr-FR" dirty="0" smtClean="0"/>
+            </a:br>
+            <a:r>
+              <a:rPr lang="fr-FR" dirty="0" smtClean="0"/>
+              <a:t/>
+            </a:r>
+            <a:br>
+              <a:rPr lang="fr-FR" dirty="0" smtClean="0"/>
+            </a:br>
+            <a:r>
+              <a:rPr lang="fr-FR" dirty="0" smtClean="0"/>
+              <a:t>[MARKER_OPENING 130 -ERR:REF-NOT-FOUND-]   ethay uickqay [MARKER_CLOSING 131 &lt;/a:t&gt;&lt;/a:r&gt;]   </a:t>
+            </a:r>
+            <a:r>
+              <a:rPr lang="fr-FR" dirty="0" err="1" smtClean="0"/>
+              <a:t>[MARKER_OPENING 132 -ERR:REF-NOT-FOUND-]   ownbray[MARKER_CLOSING 133 &lt;/a:t&gt;&lt;/a:r&gt;]   </a:t>
+            </a:r>
+            <a:r>
+              <a:rPr lang="fr-FR" dirty="0" smtClean="0"/>
+              <a:t>[MARKER_OPENING 134 -ERR:REF-NOT-FOUND-]    oxfay [MARKER_CLOSING 135 &lt;/a:t&gt;&lt;/a:r&gt;]   </a:t>
+            </a:r>
+            <a:r>
+              <a:rPr lang="fr-FR" dirty="0" err="1" smtClean="0"/>
+              <a:t>[MARKER_OPENING 136 -ERR:REF-NOT-FOUND-]   umpsjay[MARKER_CLOSING 137 &lt;/a:t&gt;&lt;/a:r&gt;]   </a:t>
+            </a:r>
+            <a:r>
+              <a:rPr lang="fr-FR" dirty="0" smtClean="0"/>
+              <a:t>[MARKER_OPENING 138 -ERR:REF-NOT-FOUND-]    overhay ethay [MARKER_CLOSING 139 &lt;/a:t&gt;&lt;/a:r&gt;]   </a:t>
+            </a:r>
+            <a:r>
+              <a:rPr lang="fr-FR" dirty="0" err="1" smtClean="0"/>
+              <a:t>[MARKER_OPENING 140 -ERR:REF-NOT-FOUND-]   azylay[MARKER_CLOSING 141 &lt;/a:t&gt;&lt;/a:r&gt;]   </a:t>
+            </a:r>
+            <a:r>
+              <a:rPr lang="fr-FR" dirty="0" smtClean="0"/>
+              <a:t>[MARKER_OPENING 142 -ERR:REF-NOT-FOUND-]    ogday. ethay uickqay [MARKER_CLOSING 143 &lt;/a:t&gt;&lt;/a:r&gt;]   </a:t>
+            </a:r>
+            <a:r>
+              <a:rPr lang="fr-FR" dirty="0" err="1" smtClean="0"/>
+              <a:t>[MARKER_OPENING 144 -ERR:REF-NOT-FOUND-]   ownbray[MARKER_CLOSING 145 &lt;/a:t&gt;&lt;/a:r&gt;]   </a:t>
+            </a:r>
+            <a:r>
+              <a:rPr lang="fr-FR" dirty="0" smtClean="0"/>
+              <a:t>[MARKER_OPENING 146 -ERR:REF-NOT-FOUND-]    oxfay [MARKER_CLOSING 147 &lt;/a:t&gt;&lt;/a:r&gt;]   </a:t>
+            </a:r>
+            <a:r>
+              <a:rPr lang="fr-FR" dirty="0" err="1" smtClean="0"/>
+              <a:t>[MARKER_OPENING 148 -ERR:REF-NOT-FOUND-]   umpsjay[MARKER_CLOSING 149 &lt;/a:t&gt;&lt;/a:r&gt;]   </a:t>
+            </a:r>
+            <a:r>
+              <a:rPr lang="fr-FR" dirty="0" smtClean="0"/>
+              <a:t>[MARKER_OPENING 150 -ERR:REF-NOT-FOUND-]    overhay ethay [MARKER_CLOSING 151 &lt;/a:t&gt;&lt;/a:r&gt;]   </a:t>
+            </a:r>
+            <a:r>
+              <a:rPr lang="fr-FR" dirty="0" err="1" smtClean="0"/>
+              <a:t>[MARKER_OPENING 152 -ERR:REF-NOT-FOUND-]   azylay[MARKER_CLOSING 153 &lt;/a:t&gt;&lt;/a:r&gt;]   </a:t>
+            </a:r>
+            <a:r>
+              <a:rPr lang="fr-FR" dirty="0" smtClean="0"/>
+              <a:t>[MARKER_OPENING 154 -ERR:REF-NOT-FOUND-]    ogday. ethay uickqay [MARKER_CLOSING 155 &lt;/a:t&gt;&lt;/a:r&gt;]   </a:t>
+            </a:r>
+            <a:r>
+              <a:rPr lang="fr-FR" dirty="0" err="1" smtClean="0"/>
+              <a:t>[MARKER_OPENING 156 -ERR:REF-NOT-FOUND-]   ownbray[MARKER_CLOSING 157 &lt;/a:t&gt;&lt;/a:r&gt;]   </a:t>
+            </a:r>
+            <a:r>
+              <a:rPr lang="fr-FR" dirty="0" smtClean="0"/>
+              <a:t>[MARKER_OPENING 158 -ERR:REF-NOT-FOUND-]    oxfay [MARKER_CLOSING 159 &lt;/a:t&gt;&lt;/a:r&gt;]   </a:t>
+            </a:r>
+            <a:r>
+              <a:rPr lang="fr-FR" dirty="0" err="1" smtClean="0"/>
+              <a:t>[MARKER_OPENING 160 -ERR:REF-NOT-FOUND-]   umpsjay[MARKER_CLOSING 161 &lt;/a:t&gt;&lt;/a:r&gt;]   </a:t>
+            </a:r>
+            <a:r>
+              <a:rPr lang="fr-FR" dirty="0" smtClean="0"/>
+              <a:t>[MARKER_OPENING 162 -ERR:REF-NOT-FOUND-]    overhay ethay [MARKER_CLOSING 163 &lt;/a:t&gt;&lt;/a:r&gt;]   </a:t>
+            </a:r>
+            <a:r>
+              <a:rPr lang="fr-FR" dirty="0" err="1" smtClean="0"/>
+              <a:t>[MARKER_OPENING 164 -ERR:REF-NOT-FOUND-]   azylay[MARKER_CLOSING 165 &lt;/a:t&gt;&lt;/a:r&gt;]   </a:t>
+            </a:r>
+            <a:r>
+              <a:rPr lang="fr-FR" dirty="0" smtClean="0"/>
+              <a:t>[MARKER_OPENING 166 -ERR:REF-NOT-FOUND-]    ogday. ethay uickqay [MARKER_CLOSING 167 &lt;/a:t&gt;&lt;/a:r&gt;]   </a:t>
+            </a:r>
+            <a:r>
+              <a:rPr lang="fr-FR" dirty="0" err="1" smtClean="0"/>
+              <a:t>[MARKER_OPENING 168 -ERR:REF-NOT-FOUND-]   ownbray[MARKER_CLOSING 169 &lt;/a:t&gt;&lt;/a:r&gt;]   </a:t>
+            </a:r>
+            <a:r>
+              <a:rPr lang="fr-FR" dirty="0" smtClean="0"/>
+              <a:t>[MARKER_OPENING 170 -ERR:REF-NOT-FOUND-]    oxfay [MARKER_CLOSING 171 &lt;/a:t&gt;&lt;/a:r&gt;]   </a:t>
+            </a:r>
+            <a:r>
+              <a:rPr lang="fr-FR" dirty="0" err="1" smtClean="0"/>
+              <a:t>[MARKER_OPENING 172 -ERR:REF-NOT-FOUND-]   umpsjay[MARKER_CLOSING 173 &lt;/a:t&gt;&lt;/a:r&gt;]   </a:t>
+            </a:r>
+            <a:r>
+              <a:rPr lang="fr-FR" dirty="0" smtClean="0"/>
+              <a:t>[MARKER_OPENING 174 -ERR:REF-NOT-FOUND-]    overhay ethay [MARKER_CLOSING 175 &lt;/a:t&gt;&lt;/a:r&gt;]   </a:t>
+            </a:r>
+            <a:r>
+              <a:rPr lang="fr-FR" dirty="0" err="1" smtClean="0"/>
+              <a:t>[MARKER_OPENING 176 -ERR:REF-NOT-FOUND-]   azylay[MARKER_CLOSING 177 &lt;/a:t&gt;&lt;/a:r&gt;]   </a:t>
+            </a:r>
+            <a:r>
+              <a:rPr lang="fr-FR" dirty="0" smtClean="0"/>
+              <a:t>[MARKER_OPENING 178 -ERR:REF-NOT-FOUND-]    ogday. ethay uickqay [MARKER_CLOSING 179 &lt;/a:t&gt;&lt;/a:r&gt;]   </a:t>
+            </a:r>
+            <a:r>
+              <a:rPr lang="fr-FR" dirty="0" err="1" smtClean="0"/>
+              <a:t>[MARKER_OPENING 180 -ERR:REF-NOT-FOUND-]   ownbray[MARKER_CLOSING 181 &lt;/a:t&gt;&lt;/a:r&gt;]   </a:t>
+            </a:r>
+            <a:r>
+              <a:rPr lang="fr-FR" dirty="0" smtClean="0"/>
+              <a:t>[MARKER_OPENING 182 -ERR:REF-NOT-FOUND-]    oxfay [MARKER_CLOSING 183 &lt;/a:t&gt;&lt;/a:r&gt;]   </a:t>
+            </a:r>
+            <a:r>
+              <a:rPr lang="fr-FR" dirty="0" err="1" smtClean="0"/>
+              <a:t>[MARKER_OPENING 184 -ERR:REF-NOT-FOUND-]   umpsjay[MARKER_CLOSING 185 &lt;/a:t&gt;&lt;/a:r&gt;]   </a:t>
+            </a:r>
+            <a:r>
+              <a:rPr lang="fr-FR" dirty="0" smtClean="0"/>
+              <a:t>[MARKER_OPENING 186 -ERR:REF-NOT-FOUND-]    overhay ethay [MARKER_CLOSING 187 &lt;/a:t&gt;&lt;/a:r&gt;]   </a:t>
+            </a:r>
+            <a:r>
+              <a:rPr lang="fr-FR" dirty="0" err="1" smtClean="0"/>
+              <a:t>[MARKER_OPENING 188 -ERR:REF-NOT-FOUND-]   azylay[MARKER_CLOSING 189 &lt;/a:t&gt;&lt;/a:r&gt;]   </a:t>
+            </a:r>
+            <a:r>
+              <a:rPr lang="fr-FR" dirty="0" smtClean="0"/>
+              <a:t>[MARKER_OPENING 190 -ERR:REF-NOT-FOUND-]    ogday. [MARKER_CLOSING 191 &lt;/a:t&gt;&lt;/a:r&gt;]   </a:t>
+            </a:r>
+            <a:br>
+              <a:rPr lang="fr-FR" dirty="0" smtClean="0"/>
+            </a:br>
+            <a:endParaRPr lang="fr-FR" dirty="0"/>
+          </a:p>
+        </p:txBody>
+      </p:sp>
+    </p:spTree>
+  </p:cSld>
+  <p:clrMapOvr>
+    <a:masterClrMapping/>
+  </p:clrMapOvr>
+</p:sld>
 </file>
 
 <file path=ppt/theme/theme1.xml><?xml version="1.0" encoding="utf-8"?>

</xml_diff>

<commit_message>
OpenXML Encoder and better Excel coverage.
git-svn-id: https://okapi.googlecode.com/svn/trunk@1939 0cd2bb99-014b-0410-b875-5d0485b745ed
</commit_message>
<xml_diff>
--- a/filters/net.sf.okapi.filters.openxml.tests/gold/Peeksample.pptx
+++ b/filters/net.sf.okapi.filters.openxml.tests/gold/Peeksample.pptx
@@ -3076,7 +3076,7 @@
           <a:p>
             <a:r>
               <a:rPr lang="fr-FR" dirty="0" smtClean="0"/>
-              <a:t>[MARKER_OPENING 0 -ERR:REF-NOT-FOUND-]   =andray()[MARKER_CLOSING 1 &lt;/a:t&gt;&lt;/a:r&gt;]   </a:t>
+              <a:t>[MARKER_OPENING 0 -ERR:REF-NOT-FOUND-]   =andray()[MARKER_CLOSING 1 &amp;lt;/a:t&gt;&amp;lt;/a:r&gt;]   </a:t>
             </a:r>
             <a:endParaRPr lang="fr-FR" dirty="0"/>
           </a:p>
@@ -3104,127 +3104,127 @@
             </a:pPr>
             <a:r>
               <a:rPr lang="fr-FR" dirty="0" smtClean="0"/>
-              <a:t>[MARKER_OPENING 0 -ERR:REF-NOT-FOUND-]   ethay uickqay [MARKER_CLOSING 1 &lt;/a:t&gt;&lt;/a:r&gt;]   </a:t>
-            </a:r>
-            <a:r>
-              <a:rPr lang="fr-FR" dirty="0" err="1" smtClean="0"/>
-              <a:t>[MARKER_OPENING 2 -ERR:REF-NOT-FOUND-]   ownbray[MARKER_CLOSING 3 &lt;/a:t&gt;&lt;/a:r&gt;]   </a:t>
-            </a:r>
-            <a:r>
-              <a:rPr lang="fr-FR" dirty="0" smtClean="0"/>
-              <a:t>[MARKER_OPENING 4 -ERR:REF-NOT-FOUND-]    oxfay [MARKER_CLOSING 5 &lt;/a:t&gt;&lt;/a:r&gt;]   </a:t>
-            </a:r>
-            <a:r>
-              <a:rPr lang="fr-FR" dirty="0" err="1" smtClean="0"/>
-              <a:t>[MARKER_OPENING 6 -ERR:REF-NOT-FOUND-]   umpsjay[MARKER_CLOSING 7 &lt;/a:t&gt;&lt;/a:r&gt;]   </a:t>
-            </a:r>
-            <a:r>
-              <a:rPr lang="fr-FR" dirty="0" smtClean="0"/>
-              <a:t>[MARKER_OPENING 8 -ERR:REF-NOT-FOUND-]    overhay ethay [MARKER_CLOSING 9 &lt;/a:t&gt;&lt;/a:r&gt;]   </a:t>
-            </a:r>
-            <a:r>
-              <a:rPr lang="fr-FR" dirty="0" err="1" smtClean="0"/>
-              <a:t>[MARKER_OPENING 10 -ERR:REF-NOT-FOUND-]   azylay[MARKER_CLOSING 11 &lt;/a:t&gt;&lt;/a:r&gt;]   </a:t>
-            </a:r>
-            <a:r>
-              <a:rPr lang="fr-FR" dirty="0" smtClean="0"/>
-              <a:t>[MARKER_OPENING 12 -ERR:REF-NOT-FOUND-]    ogday. ethay uickqay [MARKER_CLOSING 13 &lt;/a:t&gt;&lt;/a:r&gt;]   </a:t>
-            </a:r>
-            <a:r>
-              <a:rPr lang="fr-FR" dirty="0" err="1" smtClean="0"/>
-              <a:t>[MARKER_OPENING 14 -ERR:REF-NOT-FOUND-]   ownbray[MARKER_CLOSING 15 &lt;/a:t&gt;&lt;/a:r&gt;]   </a:t>
-            </a:r>
-            <a:r>
-              <a:rPr lang="fr-FR" dirty="0" smtClean="0"/>
-              <a:t>[MARKER_OPENING 16 -ERR:REF-NOT-FOUND-]    oxfay [MARKER_CLOSING 17 &lt;/a:t&gt;&lt;/a:r&gt;]   </a:t>
-            </a:r>
-            <a:r>
-              <a:rPr lang="fr-FR" dirty="0" err="1" smtClean="0"/>
-              <a:t>[MARKER_OPENING 18 -ERR:REF-NOT-FOUND-]   umpsjay[MARKER_CLOSING 19 &lt;/a:t&gt;&lt;/a:r&gt;]   </a:t>
-            </a:r>
-            <a:r>
-              <a:rPr lang="fr-FR" dirty="0" smtClean="0"/>
-              <a:t>[MARKER_OPENING 20 -ERR:REF-NOT-FOUND-]    overhay ethay [MARKER_CLOSING 21 &lt;/a:t&gt;&lt;/a:r&gt;]   </a:t>
-            </a:r>
-            <a:r>
-              <a:rPr lang="fr-FR" dirty="0" err="1" smtClean="0"/>
-              <a:t>[MARKER_OPENING 22 -ERR:REF-NOT-FOUND-]   azylay[MARKER_CLOSING 23 &lt;/a:t&gt;&lt;/a:r&gt;]   </a:t>
-            </a:r>
-            <a:r>
-              <a:rPr lang="fr-FR" dirty="0" smtClean="0"/>
-              <a:t>[MARKER_OPENING 24 -ERR:REF-NOT-FOUND-]    ogday. ethay uickqay [MARKER_CLOSING 25 &lt;/a:t&gt;&lt;/a:r&gt;]   </a:t>
-            </a:r>
-            <a:r>
-              <a:rPr lang="fr-FR" dirty="0" err="1" smtClean="0"/>
-              <a:t>[MARKER_OPENING 26 -ERR:REF-NOT-FOUND-]   ownbray[MARKER_CLOSING 27 &lt;/a:t&gt;&lt;/a:r&gt;]   </a:t>
-            </a:r>
-            <a:r>
-              <a:rPr lang="fr-FR" dirty="0" smtClean="0"/>
-              <a:t>[MARKER_OPENING 28 -ERR:REF-NOT-FOUND-]    oxfay [MARKER_CLOSING 29 &lt;/a:t&gt;&lt;/a:r&gt;]   </a:t>
-            </a:r>
-            <a:r>
-              <a:rPr lang="fr-FR" dirty="0" err="1" smtClean="0"/>
-              <a:t>[MARKER_OPENING 30 -ERR:REF-NOT-FOUND-]   umpsjay[MARKER_CLOSING 31 &lt;/a:t&gt;&lt;/a:r&gt;]   </a:t>
-            </a:r>
-            <a:r>
-              <a:rPr lang="fr-FR" dirty="0" smtClean="0"/>
-              <a:t>[MARKER_OPENING 32 -ERR:REF-NOT-FOUND-]    overhay ethay [MARKER_CLOSING 33 &lt;/a:t&gt;&lt;/a:r&gt;]   </a:t>
-            </a:r>
-            <a:r>
-              <a:rPr lang="fr-FR" dirty="0" err="1" smtClean="0"/>
-              <a:t>[MARKER_OPENING 34 -ERR:REF-NOT-FOUND-]   azylay[MARKER_CLOSING 35 &lt;/a:t&gt;&lt;/a:r&gt;]   </a:t>
-            </a:r>
-            <a:r>
-              <a:rPr lang="fr-FR" dirty="0" smtClean="0"/>
-              <a:t>[MARKER_OPENING 36 -ERR:REF-NOT-FOUND-]    ogday. ethay uickqay [MARKER_CLOSING 37 &lt;/a:t&gt;&lt;/a:r&gt;]   </a:t>
-            </a:r>
-            <a:r>
-              <a:rPr lang="fr-FR" dirty="0" err="1" smtClean="0"/>
-              <a:t>[MARKER_OPENING 38 -ERR:REF-NOT-FOUND-]   ownbray[MARKER_CLOSING 39 &lt;/a:t&gt;&lt;/a:r&gt;]   </a:t>
-            </a:r>
-            <a:r>
-              <a:rPr lang="fr-FR" dirty="0" smtClean="0"/>
-              <a:t>[MARKER_OPENING 40 -ERR:REF-NOT-FOUND-]    oxfay [MARKER_CLOSING 41 &lt;/a:t&gt;&lt;/a:r&gt;]   </a:t>
-            </a:r>
-            <a:r>
-              <a:rPr lang="fr-FR" dirty="0" err="1" smtClean="0"/>
-              <a:t>[MARKER_OPENING 42 -ERR:REF-NOT-FOUND-]   umpsjay[MARKER_CLOSING 43 &lt;/a:t&gt;&lt;/a:r&gt;]   </a:t>
-            </a:r>
-            <a:r>
-              <a:rPr lang="fr-FR" dirty="0" smtClean="0"/>
-              <a:t>[MARKER_OPENING 44 -ERR:REF-NOT-FOUND-]    overhay ethay [MARKER_CLOSING 45 &lt;/a:t&gt;&lt;/a:r&gt;]   </a:t>
-            </a:r>
-            <a:r>
-              <a:rPr lang="fr-FR" dirty="0" err="1" smtClean="0"/>
-              <a:t>[MARKER_OPENING 46 -ERR:REF-NOT-FOUND-]   azylay[MARKER_CLOSING 47 &lt;/a:t&gt;&lt;/a:r&gt;]   </a:t>
-            </a:r>
-            <a:r>
-              <a:rPr lang="fr-FR" dirty="0" smtClean="0"/>
-              <a:t>[MARKER_OPENING 48 -ERR:REF-NOT-FOUND-]    ogday. ethay uickqay [MARKER_CLOSING 49 &lt;/a:t&gt;&lt;/a:r&gt;]   </a:t>
-            </a:r>
-            <a:r>
-              <a:rPr lang="fr-FR" dirty="0" err="1" smtClean="0"/>
-              <a:t>[MARKER_OPENING 50 -ERR:REF-NOT-FOUND-]   ownbray[MARKER_CLOSING 51 &lt;/a:t&gt;&lt;/a:r&gt;]   </a:t>
-            </a:r>
-            <a:r>
-              <a:rPr lang="fr-FR" dirty="0" smtClean="0"/>
-              <a:t>[MARKER_OPENING 52 -ERR:REF-NOT-FOUND-]    oxfay [MARKER_CLOSING 53 &lt;/a:t&gt;&lt;/a:r&gt;]   </a:t>
-            </a:r>
-            <a:r>
-              <a:rPr lang="fr-FR" dirty="0" err="1" smtClean="0"/>
-              <a:t>[MARKER_OPENING 54 -ERR:REF-NOT-FOUND-]   umpsjay[MARKER_CLOSING 55 &lt;/a:t&gt;&lt;/a:r&gt;]   </a:t>
-            </a:r>
-            <a:r>
-              <a:rPr lang="fr-FR" dirty="0" smtClean="0"/>
-              <a:t>[MARKER_OPENING 56 -ERR:REF-NOT-FOUND-]    overhay ethay [MARKER_CLOSING 57 &lt;/a:t&gt;&lt;/a:r&gt;]   </a:t>
-            </a:r>
-            <a:r>
-              <a:rPr lang="fr-FR" dirty="0" err="1" smtClean="0"/>
-              <a:t>[MARKER_OPENING 58 -ERR:REF-NOT-FOUND-]   azylay[MARKER_CLOSING 59 &lt;/a:t&gt;&lt;/a:r&gt;]   </a:t>
-            </a:r>
-            <a:r>
-              <a:rPr lang="fr-FR" dirty="0" smtClean="0"/>
-              <a:t>[MARKER_OPENING 60 -ERR:REF-NOT-FOUND-]    ogday. [MARKER_CLOSING 61 &lt;/a:t&gt;&lt;/a:r&gt;]   </a:t>
+              <a:t>[MARKER_OPENING 0 -ERR:REF-NOT-FOUND-]   ethay uickqay [MARKER_CLOSING 1 &amp;lt;/a:t&gt;&amp;lt;/a:r&gt;]   </a:t>
+            </a:r>
+            <a:r>
+              <a:rPr lang="fr-FR" dirty="0" err="1" smtClean="0"/>
+              <a:t>[MARKER_OPENING 2 -ERR:REF-NOT-FOUND-]   ownbray[MARKER_CLOSING 3 &amp;lt;/a:t&gt;&amp;lt;/a:r&gt;]   </a:t>
+            </a:r>
+            <a:r>
+              <a:rPr lang="fr-FR" dirty="0" smtClean="0"/>
+              <a:t>[MARKER_OPENING 4 -ERR:REF-NOT-FOUND-]    oxfay [MARKER_CLOSING 5 &amp;lt;/a:t&gt;&amp;lt;/a:r&gt;]   </a:t>
+            </a:r>
+            <a:r>
+              <a:rPr lang="fr-FR" dirty="0" err="1" smtClean="0"/>
+              <a:t>[MARKER_OPENING 6 -ERR:REF-NOT-FOUND-]   umpsjay[MARKER_CLOSING 7 &amp;lt;/a:t&gt;&amp;lt;/a:r&gt;]   </a:t>
+            </a:r>
+            <a:r>
+              <a:rPr lang="fr-FR" dirty="0" smtClean="0"/>
+              <a:t>[MARKER_OPENING 8 -ERR:REF-NOT-FOUND-]    overhay ethay [MARKER_CLOSING 9 &amp;lt;/a:t&gt;&amp;lt;/a:r&gt;]   </a:t>
+            </a:r>
+            <a:r>
+              <a:rPr lang="fr-FR" dirty="0" err="1" smtClean="0"/>
+              <a:t>[MARKER_OPENING 10 -ERR:REF-NOT-FOUND-]   azylay[MARKER_CLOSING 11 &amp;lt;/a:t&gt;&amp;lt;/a:r&gt;]   </a:t>
+            </a:r>
+            <a:r>
+              <a:rPr lang="fr-FR" dirty="0" smtClean="0"/>
+              <a:t>[MARKER_OPENING 12 -ERR:REF-NOT-FOUND-]    ogday. ethay uickqay [MARKER_CLOSING 13 &amp;lt;/a:t&gt;&amp;lt;/a:r&gt;]   </a:t>
+            </a:r>
+            <a:r>
+              <a:rPr lang="fr-FR" dirty="0" err="1" smtClean="0"/>
+              <a:t>[MARKER_OPENING 14 -ERR:REF-NOT-FOUND-]   ownbray[MARKER_CLOSING 15 &amp;lt;/a:t&gt;&amp;lt;/a:r&gt;]   </a:t>
+            </a:r>
+            <a:r>
+              <a:rPr lang="fr-FR" dirty="0" smtClean="0"/>
+              <a:t>[MARKER_OPENING 16 -ERR:REF-NOT-FOUND-]    oxfay [MARKER_CLOSING 17 &amp;lt;/a:t&gt;&amp;lt;/a:r&gt;]   </a:t>
+            </a:r>
+            <a:r>
+              <a:rPr lang="fr-FR" dirty="0" err="1" smtClean="0"/>
+              <a:t>[MARKER_OPENING 18 -ERR:REF-NOT-FOUND-]   umpsjay[MARKER_CLOSING 19 &amp;lt;/a:t&gt;&amp;lt;/a:r&gt;]   </a:t>
+            </a:r>
+            <a:r>
+              <a:rPr lang="fr-FR" dirty="0" smtClean="0"/>
+              <a:t>[MARKER_OPENING 20 -ERR:REF-NOT-FOUND-]    overhay ethay [MARKER_CLOSING 21 &amp;lt;/a:t&gt;&amp;lt;/a:r&gt;]   </a:t>
+            </a:r>
+            <a:r>
+              <a:rPr lang="fr-FR" dirty="0" err="1" smtClean="0"/>
+              <a:t>[MARKER_OPENING 22 -ERR:REF-NOT-FOUND-]   azylay[MARKER_CLOSING 23 &amp;lt;/a:t&gt;&amp;lt;/a:r&gt;]   </a:t>
+            </a:r>
+            <a:r>
+              <a:rPr lang="fr-FR" dirty="0" smtClean="0"/>
+              <a:t>[MARKER_OPENING 24 -ERR:REF-NOT-FOUND-]    ogday. ethay uickqay [MARKER_CLOSING 25 &amp;lt;/a:t&gt;&amp;lt;/a:r&gt;]   </a:t>
+            </a:r>
+            <a:r>
+              <a:rPr lang="fr-FR" dirty="0" err="1" smtClean="0"/>
+              <a:t>[MARKER_OPENING 26 -ERR:REF-NOT-FOUND-]   ownbray[MARKER_CLOSING 27 &amp;lt;/a:t&gt;&amp;lt;/a:r&gt;]   </a:t>
+            </a:r>
+            <a:r>
+              <a:rPr lang="fr-FR" dirty="0" smtClean="0"/>
+              <a:t>[MARKER_OPENING 28 -ERR:REF-NOT-FOUND-]    oxfay [MARKER_CLOSING 29 &amp;lt;/a:t&gt;&amp;lt;/a:r&gt;]   </a:t>
+            </a:r>
+            <a:r>
+              <a:rPr lang="fr-FR" dirty="0" err="1" smtClean="0"/>
+              <a:t>[MARKER_OPENING 30 -ERR:REF-NOT-FOUND-]   umpsjay[MARKER_CLOSING 31 &amp;lt;/a:t&gt;&amp;lt;/a:r&gt;]   </a:t>
+            </a:r>
+            <a:r>
+              <a:rPr lang="fr-FR" dirty="0" smtClean="0"/>
+              <a:t>[MARKER_OPENING 32 -ERR:REF-NOT-FOUND-]    overhay ethay [MARKER_CLOSING 33 &amp;lt;/a:t&gt;&amp;lt;/a:r&gt;]   </a:t>
+            </a:r>
+            <a:r>
+              <a:rPr lang="fr-FR" dirty="0" err="1" smtClean="0"/>
+              <a:t>[MARKER_OPENING 34 -ERR:REF-NOT-FOUND-]   azylay[MARKER_CLOSING 35 &amp;lt;/a:t&gt;&amp;lt;/a:r&gt;]   </a:t>
+            </a:r>
+            <a:r>
+              <a:rPr lang="fr-FR" dirty="0" smtClean="0"/>
+              <a:t>[MARKER_OPENING 36 -ERR:REF-NOT-FOUND-]    ogday. ethay uickqay [MARKER_CLOSING 37 &amp;lt;/a:t&gt;&amp;lt;/a:r&gt;]   </a:t>
+            </a:r>
+            <a:r>
+              <a:rPr lang="fr-FR" dirty="0" err="1" smtClean="0"/>
+              <a:t>[MARKER_OPENING 38 -ERR:REF-NOT-FOUND-]   ownbray[MARKER_CLOSING 39 &amp;lt;/a:t&gt;&amp;lt;/a:r&gt;]   </a:t>
+            </a:r>
+            <a:r>
+              <a:rPr lang="fr-FR" dirty="0" smtClean="0"/>
+              <a:t>[MARKER_OPENING 40 -ERR:REF-NOT-FOUND-]    oxfay [MARKER_CLOSING 41 &amp;lt;/a:t&gt;&amp;lt;/a:r&gt;]   </a:t>
+            </a:r>
+            <a:r>
+              <a:rPr lang="fr-FR" dirty="0" err="1" smtClean="0"/>
+              <a:t>[MARKER_OPENING 42 -ERR:REF-NOT-FOUND-]   umpsjay[MARKER_CLOSING 43 &amp;lt;/a:t&gt;&amp;lt;/a:r&gt;]   </a:t>
+            </a:r>
+            <a:r>
+              <a:rPr lang="fr-FR" dirty="0" smtClean="0"/>
+              <a:t>[MARKER_OPENING 44 -ERR:REF-NOT-FOUND-]    overhay ethay [MARKER_CLOSING 45 &amp;lt;/a:t&gt;&amp;lt;/a:r&gt;]   </a:t>
+            </a:r>
+            <a:r>
+              <a:rPr lang="fr-FR" dirty="0" err="1" smtClean="0"/>
+              <a:t>[MARKER_OPENING 46 -ERR:REF-NOT-FOUND-]   azylay[MARKER_CLOSING 47 &amp;lt;/a:t&gt;&amp;lt;/a:r&gt;]   </a:t>
+            </a:r>
+            <a:r>
+              <a:rPr lang="fr-FR" dirty="0" smtClean="0"/>
+              <a:t>[MARKER_OPENING 48 -ERR:REF-NOT-FOUND-]    ogday. ethay uickqay [MARKER_CLOSING 49 &amp;lt;/a:t&gt;&amp;lt;/a:r&gt;]   </a:t>
+            </a:r>
+            <a:r>
+              <a:rPr lang="fr-FR" dirty="0" err="1" smtClean="0"/>
+              <a:t>[MARKER_OPENING 50 -ERR:REF-NOT-FOUND-]   ownbray[MARKER_CLOSING 51 &amp;lt;/a:t&gt;&amp;lt;/a:r&gt;]   </a:t>
+            </a:r>
+            <a:r>
+              <a:rPr lang="fr-FR" dirty="0" smtClean="0"/>
+              <a:t>[MARKER_OPENING 52 -ERR:REF-NOT-FOUND-]    oxfay [MARKER_CLOSING 53 &amp;lt;/a:t&gt;&amp;lt;/a:r&gt;]   </a:t>
+            </a:r>
+            <a:r>
+              <a:rPr lang="fr-FR" dirty="0" err="1" smtClean="0"/>
+              <a:t>[MARKER_OPENING 54 -ERR:REF-NOT-FOUND-]   umpsjay[MARKER_CLOSING 55 &amp;lt;/a:t&gt;&amp;lt;/a:r&gt;]   </a:t>
+            </a:r>
+            <a:r>
+              <a:rPr lang="fr-FR" dirty="0" smtClean="0"/>
+              <a:t>[MARKER_OPENING 56 -ERR:REF-NOT-FOUND-]    overhay ethay [MARKER_CLOSING 57 &amp;lt;/a:t&gt;&amp;lt;/a:r&gt;]   </a:t>
+            </a:r>
+            <a:r>
+              <a:rPr lang="fr-FR" dirty="0" err="1" smtClean="0"/>
+              <a:t>[MARKER_OPENING 58 -ERR:REF-NOT-FOUND-]   azylay[MARKER_CLOSING 59 &amp;lt;/a:t&gt;&amp;lt;/a:r&gt;]   </a:t>
+            </a:r>
+            <a:r>
+              <a:rPr lang="fr-FR" dirty="0" smtClean="0"/>
+              <a:t>[MARKER_OPENING 60 -ERR:REF-NOT-FOUND-]    ogday. [MARKER_CLOSING 61 &amp;lt;/a:t&gt;&amp;lt;/a:r&gt;]   </a:t>
             </a:r>
             <a:br>
               <a:rPr lang="fr-FR" dirty="0" smtClean="0"/>
@@ -3238,127 +3238,127 @@
             </a:br>
             <a:r>
               <a:rPr lang="fr-FR" dirty="0" smtClean="0"/>
-              <a:t>[MARKER_OPENING 65 -ERR:REF-NOT-FOUND-]   ethay uickqay [MARKER_CLOSING 66 &lt;/a:t&gt;&lt;/a:r&gt;]   </a:t>
-            </a:r>
-            <a:r>
-              <a:rPr lang="fr-FR" dirty="0" err="1" smtClean="0"/>
-              <a:t>[MARKER_OPENING 67 -ERR:REF-NOT-FOUND-]   ownbray[MARKER_CLOSING 68 &lt;/a:t&gt;&lt;/a:r&gt;]   </a:t>
-            </a:r>
-            <a:r>
-              <a:rPr lang="fr-FR" dirty="0" smtClean="0"/>
-              <a:t>[MARKER_OPENING 69 -ERR:REF-NOT-FOUND-]    oxfay [MARKER_CLOSING 70 &lt;/a:t&gt;&lt;/a:r&gt;]   </a:t>
-            </a:r>
-            <a:r>
-              <a:rPr lang="fr-FR" dirty="0" err="1" smtClean="0"/>
-              <a:t>[MARKER_OPENING 71 -ERR:REF-NOT-FOUND-]   umpsjay[MARKER_CLOSING 72 &lt;/a:t&gt;&lt;/a:r&gt;]   </a:t>
-            </a:r>
-            <a:r>
-              <a:rPr lang="fr-FR" dirty="0" smtClean="0"/>
-              <a:t>[MARKER_OPENING 73 -ERR:REF-NOT-FOUND-]    overhay ethay [MARKER_CLOSING 74 &lt;/a:t&gt;&lt;/a:r&gt;]   </a:t>
-            </a:r>
-            <a:r>
-              <a:rPr lang="fr-FR" dirty="0" err="1" smtClean="0"/>
-              <a:t>[MARKER_OPENING 75 -ERR:REF-NOT-FOUND-]   azylay[MARKER_CLOSING 76 &lt;/a:t&gt;&lt;/a:r&gt;]   </a:t>
-            </a:r>
-            <a:r>
-              <a:rPr lang="fr-FR" dirty="0" smtClean="0"/>
-              <a:t>[MARKER_OPENING 77 -ERR:REF-NOT-FOUND-]    ogday. ethay uickqay [MARKER_CLOSING 78 &lt;/a:t&gt;&lt;/a:r&gt;]   </a:t>
-            </a:r>
-            <a:r>
-              <a:rPr lang="fr-FR" dirty="0" err="1" smtClean="0"/>
-              <a:t>[MARKER_OPENING 79 -ERR:REF-NOT-FOUND-]   ownbray[MARKER_CLOSING 80 &lt;/a:t&gt;&lt;/a:r&gt;]   </a:t>
-            </a:r>
-            <a:r>
-              <a:rPr lang="fr-FR" dirty="0" smtClean="0"/>
-              <a:t>[MARKER_OPENING 81 -ERR:REF-NOT-FOUND-]    oxfay [MARKER_CLOSING 82 &lt;/a:t&gt;&lt;/a:r&gt;]   </a:t>
-            </a:r>
-            <a:r>
-              <a:rPr lang="fr-FR" dirty="0" err="1" smtClean="0"/>
-              <a:t>[MARKER_OPENING 83 -ERR:REF-NOT-FOUND-]   umpsjay[MARKER_CLOSING 84 &lt;/a:t&gt;&lt;/a:r&gt;]   </a:t>
-            </a:r>
-            <a:r>
-              <a:rPr lang="fr-FR" dirty="0" smtClean="0"/>
-              <a:t>[MARKER_OPENING 85 -ERR:REF-NOT-FOUND-]    overhay ethay [MARKER_CLOSING 86 &lt;/a:t&gt;&lt;/a:r&gt;]   </a:t>
-            </a:r>
-            <a:r>
-              <a:rPr lang="fr-FR" dirty="0" err="1" smtClean="0"/>
-              <a:t>[MARKER_OPENING 87 -ERR:REF-NOT-FOUND-]   azylay[MARKER_CLOSING 88 &lt;/a:t&gt;&lt;/a:r&gt;]   </a:t>
-            </a:r>
-            <a:r>
-              <a:rPr lang="fr-FR" dirty="0" smtClean="0"/>
-              <a:t>[MARKER_OPENING 89 -ERR:REF-NOT-FOUND-]    ogday. ethay uickqay [MARKER_CLOSING 90 &lt;/a:t&gt;&lt;/a:r&gt;]   </a:t>
-            </a:r>
-            <a:r>
-              <a:rPr lang="fr-FR" dirty="0" err="1" smtClean="0"/>
-              <a:t>[MARKER_OPENING 91 -ERR:REF-NOT-FOUND-]   ownbray[MARKER_CLOSING 92 &lt;/a:t&gt;&lt;/a:r&gt;]   </a:t>
-            </a:r>
-            <a:r>
-              <a:rPr lang="fr-FR" dirty="0" smtClean="0"/>
-              <a:t>[MARKER_OPENING 93 -ERR:REF-NOT-FOUND-]    oxfay [MARKER_CLOSING 94 &lt;/a:t&gt;&lt;/a:r&gt;]   </a:t>
-            </a:r>
-            <a:r>
-              <a:rPr lang="fr-FR" dirty="0" err="1" smtClean="0"/>
-              <a:t>[MARKER_OPENING 95 -ERR:REF-NOT-FOUND-]   umpsjay[MARKER_CLOSING 96 &lt;/a:t&gt;&lt;/a:r&gt;]   </a:t>
-            </a:r>
-            <a:r>
-              <a:rPr lang="fr-FR" dirty="0" smtClean="0"/>
-              <a:t>[MARKER_OPENING 97 -ERR:REF-NOT-FOUND-]    overhay ethay [MARKER_CLOSING 98 &lt;/a:t&gt;&lt;/a:r&gt;]   </a:t>
-            </a:r>
-            <a:r>
-              <a:rPr lang="fr-FR" dirty="0" err="1" smtClean="0"/>
-              <a:t>[MARKER_OPENING 99 -ERR:REF-NOT-FOUND-]   azylay[MARKER_CLOSING 100 &lt;/a:t&gt;&lt;/a:r&gt;]   </a:t>
-            </a:r>
-            <a:r>
-              <a:rPr lang="fr-FR" dirty="0" smtClean="0"/>
-              <a:t>[MARKER_OPENING 101 -ERR:REF-NOT-FOUND-]    ogday. ethay uickqay [MARKER_CLOSING 102 &lt;/a:t&gt;&lt;/a:r&gt;]   </a:t>
-            </a:r>
-            <a:r>
-              <a:rPr lang="fr-FR" dirty="0" err="1" smtClean="0"/>
-              <a:t>[MARKER_OPENING 103 -ERR:REF-NOT-FOUND-]   ownbray[MARKER_CLOSING 104 &lt;/a:t&gt;&lt;/a:r&gt;]   </a:t>
-            </a:r>
-            <a:r>
-              <a:rPr lang="fr-FR" dirty="0" smtClean="0"/>
-              <a:t>[MARKER_OPENING 105 -ERR:REF-NOT-FOUND-]    oxfay [MARKER_CLOSING 106 &lt;/a:t&gt;&lt;/a:r&gt;]   </a:t>
-            </a:r>
-            <a:r>
-              <a:rPr lang="fr-FR" dirty="0" err="1" smtClean="0"/>
-              <a:t>[MARKER_OPENING 107 -ERR:REF-NOT-FOUND-]   umpsjay[MARKER_CLOSING 108 &lt;/a:t&gt;&lt;/a:r&gt;]   </a:t>
-            </a:r>
-            <a:r>
-              <a:rPr lang="fr-FR" dirty="0" smtClean="0"/>
-              <a:t>[MARKER_OPENING 109 -ERR:REF-NOT-FOUND-]    overhay ethay [MARKER_CLOSING 110 &lt;/a:t&gt;&lt;/a:r&gt;]   </a:t>
-            </a:r>
-            <a:r>
-              <a:rPr lang="fr-FR" dirty="0" err="1" smtClean="0"/>
-              <a:t>[MARKER_OPENING 111 -ERR:REF-NOT-FOUND-]   azylay[MARKER_CLOSING 112 &lt;/a:t&gt;&lt;/a:r&gt;]   </a:t>
-            </a:r>
-            <a:r>
-              <a:rPr lang="fr-FR" dirty="0" smtClean="0"/>
-              <a:t>[MARKER_OPENING 113 -ERR:REF-NOT-FOUND-]    ogday. ethay uickqay [MARKER_CLOSING 114 &lt;/a:t&gt;&lt;/a:r&gt;]   </a:t>
-            </a:r>
-            <a:r>
-              <a:rPr lang="fr-FR" dirty="0" err="1" smtClean="0"/>
-              <a:t>[MARKER_OPENING 115 -ERR:REF-NOT-FOUND-]   ownbray[MARKER_CLOSING 116 &lt;/a:t&gt;&lt;/a:r&gt;]   </a:t>
-            </a:r>
-            <a:r>
-              <a:rPr lang="fr-FR" dirty="0" smtClean="0"/>
-              <a:t>[MARKER_OPENING 117 -ERR:REF-NOT-FOUND-]    oxfay [MARKER_CLOSING 118 &lt;/a:t&gt;&lt;/a:r&gt;]   </a:t>
-            </a:r>
-            <a:r>
-              <a:rPr lang="fr-FR" dirty="0" err="1" smtClean="0"/>
-              <a:t>[MARKER_OPENING 119 -ERR:REF-NOT-FOUND-]   umpsjay[MARKER_CLOSING 120 &lt;/a:t&gt;&lt;/a:r&gt;]   </a:t>
-            </a:r>
-            <a:r>
-              <a:rPr lang="fr-FR" dirty="0" smtClean="0"/>
-              <a:t>[MARKER_OPENING 121 -ERR:REF-NOT-FOUND-]    overhay ethay [MARKER_CLOSING 122 &lt;/a:t&gt;&lt;/a:r&gt;]   </a:t>
-            </a:r>
-            <a:r>
-              <a:rPr lang="fr-FR" dirty="0" err="1" smtClean="0"/>
-              <a:t>[MARKER_OPENING 123 -ERR:REF-NOT-FOUND-]   azylay[MARKER_CLOSING 124 &lt;/a:t&gt;&lt;/a:r&gt;]   </a:t>
-            </a:r>
-            <a:r>
-              <a:rPr lang="fr-FR" dirty="0" smtClean="0"/>
-              <a:t>[MARKER_OPENING 125 -ERR:REF-NOT-FOUND-]    ogday. [MARKER_CLOSING 126 &lt;/a:t&gt;&lt;/a:r&gt;]   </a:t>
+              <a:t>[MARKER_OPENING 65 -ERR:REF-NOT-FOUND-]   ethay uickqay [MARKER_CLOSING 66 &amp;lt;/a:t&gt;&amp;lt;/a:r&gt;]   </a:t>
+            </a:r>
+            <a:r>
+              <a:rPr lang="fr-FR" dirty="0" err="1" smtClean="0"/>
+              <a:t>[MARKER_OPENING 67 -ERR:REF-NOT-FOUND-]   ownbray[MARKER_CLOSING 68 &amp;lt;/a:t&gt;&amp;lt;/a:r&gt;]   </a:t>
+            </a:r>
+            <a:r>
+              <a:rPr lang="fr-FR" dirty="0" smtClean="0"/>
+              <a:t>[MARKER_OPENING 69 -ERR:REF-NOT-FOUND-]    oxfay [MARKER_CLOSING 70 &amp;lt;/a:t&gt;&amp;lt;/a:r&gt;]   </a:t>
+            </a:r>
+            <a:r>
+              <a:rPr lang="fr-FR" dirty="0" err="1" smtClean="0"/>
+              <a:t>[MARKER_OPENING 71 -ERR:REF-NOT-FOUND-]   umpsjay[MARKER_CLOSING 72 &amp;lt;/a:t&gt;&amp;lt;/a:r&gt;]   </a:t>
+            </a:r>
+            <a:r>
+              <a:rPr lang="fr-FR" dirty="0" smtClean="0"/>
+              <a:t>[MARKER_OPENING 73 -ERR:REF-NOT-FOUND-]    overhay ethay [MARKER_CLOSING 74 &amp;lt;/a:t&gt;&amp;lt;/a:r&gt;]   </a:t>
+            </a:r>
+            <a:r>
+              <a:rPr lang="fr-FR" dirty="0" err="1" smtClean="0"/>
+              <a:t>[MARKER_OPENING 75 -ERR:REF-NOT-FOUND-]   azylay[MARKER_CLOSING 76 &amp;lt;/a:t&gt;&amp;lt;/a:r&gt;]   </a:t>
+            </a:r>
+            <a:r>
+              <a:rPr lang="fr-FR" dirty="0" smtClean="0"/>
+              <a:t>[MARKER_OPENING 77 -ERR:REF-NOT-FOUND-]    ogday. ethay uickqay [MARKER_CLOSING 78 &amp;lt;/a:t&gt;&amp;lt;/a:r&gt;]   </a:t>
+            </a:r>
+            <a:r>
+              <a:rPr lang="fr-FR" dirty="0" err="1" smtClean="0"/>
+              <a:t>[MARKER_OPENING 79 -ERR:REF-NOT-FOUND-]   ownbray[MARKER_CLOSING 80 &amp;lt;/a:t&gt;&amp;lt;/a:r&gt;]   </a:t>
+            </a:r>
+            <a:r>
+              <a:rPr lang="fr-FR" dirty="0" smtClean="0"/>
+              <a:t>[MARKER_OPENING 81 -ERR:REF-NOT-FOUND-]    oxfay [MARKER_CLOSING 82 &amp;lt;/a:t&gt;&amp;lt;/a:r&gt;]   </a:t>
+            </a:r>
+            <a:r>
+              <a:rPr lang="fr-FR" dirty="0" err="1" smtClean="0"/>
+              <a:t>[MARKER_OPENING 83 -ERR:REF-NOT-FOUND-]   umpsjay[MARKER_CLOSING 84 &amp;lt;/a:t&gt;&amp;lt;/a:r&gt;]   </a:t>
+            </a:r>
+            <a:r>
+              <a:rPr lang="fr-FR" dirty="0" smtClean="0"/>
+              <a:t>[MARKER_OPENING 85 -ERR:REF-NOT-FOUND-]    overhay ethay [MARKER_CLOSING 86 &amp;lt;/a:t&gt;&amp;lt;/a:r&gt;]   </a:t>
+            </a:r>
+            <a:r>
+              <a:rPr lang="fr-FR" dirty="0" err="1" smtClean="0"/>
+              <a:t>[MARKER_OPENING 87 -ERR:REF-NOT-FOUND-]   azylay[MARKER_CLOSING 88 &amp;lt;/a:t&gt;&amp;lt;/a:r&gt;]   </a:t>
+            </a:r>
+            <a:r>
+              <a:rPr lang="fr-FR" dirty="0" smtClean="0"/>
+              <a:t>[MARKER_OPENING 89 -ERR:REF-NOT-FOUND-]    ogday. ethay uickqay [MARKER_CLOSING 90 &amp;lt;/a:t&gt;&amp;lt;/a:r&gt;]   </a:t>
+            </a:r>
+            <a:r>
+              <a:rPr lang="fr-FR" dirty="0" err="1" smtClean="0"/>
+              <a:t>[MARKER_OPENING 91 -ERR:REF-NOT-FOUND-]   ownbray[MARKER_CLOSING 92 &amp;lt;/a:t&gt;&amp;lt;/a:r&gt;]   </a:t>
+            </a:r>
+            <a:r>
+              <a:rPr lang="fr-FR" dirty="0" smtClean="0"/>
+              <a:t>[MARKER_OPENING 93 -ERR:REF-NOT-FOUND-]    oxfay [MARKER_CLOSING 94 &amp;lt;/a:t&gt;&amp;lt;/a:r&gt;]   </a:t>
+            </a:r>
+            <a:r>
+              <a:rPr lang="fr-FR" dirty="0" err="1" smtClean="0"/>
+              <a:t>[MARKER_OPENING 95 -ERR:REF-NOT-FOUND-]   umpsjay[MARKER_CLOSING 96 &amp;lt;/a:t&gt;&amp;lt;/a:r&gt;]   </a:t>
+            </a:r>
+            <a:r>
+              <a:rPr lang="fr-FR" dirty="0" smtClean="0"/>
+              <a:t>[MARKER_OPENING 97 -ERR:REF-NOT-FOUND-]    overhay ethay [MARKER_CLOSING 98 &amp;lt;/a:t&gt;&amp;lt;/a:r&gt;]   </a:t>
+            </a:r>
+            <a:r>
+              <a:rPr lang="fr-FR" dirty="0" err="1" smtClean="0"/>
+              <a:t>[MARKER_OPENING 99 -ERR:REF-NOT-FOUND-]   azylay[MARKER_CLOSING 100 &amp;lt;/a:t&gt;&amp;lt;/a:r&gt;]   </a:t>
+            </a:r>
+            <a:r>
+              <a:rPr lang="fr-FR" dirty="0" smtClean="0"/>
+              <a:t>[MARKER_OPENING 101 -ERR:REF-NOT-FOUND-]    ogday. ethay uickqay [MARKER_CLOSING 102 &amp;lt;/a:t&gt;&amp;lt;/a:r&gt;]   </a:t>
+            </a:r>
+            <a:r>
+              <a:rPr lang="fr-FR" dirty="0" err="1" smtClean="0"/>
+              <a:t>[MARKER_OPENING 103 -ERR:REF-NOT-FOUND-]   ownbray[MARKER_CLOSING 104 &amp;lt;/a:t&gt;&amp;lt;/a:r&gt;]   </a:t>
+            </a:r>
+            <a:r>
+              <a:rPr lang="fr-FR" dirty="0" smtClean="0"/>
+              <a:t>[MARKER_OPENING 105 -ERR:REF-NOT-FOUND-]    oxfay [MARKER_CLOSING 106 &amp;lt;/a:t&gt;&amp;lt;/a:r&gt;]   </a:t>
+            </a:r>
+            <a:r>
+              <a:rPr lang="fr-FR" dirty="0" err="1" smtClean="0"/>
+              <a:t>[MARKER_OPENING 107 -ERR:REF-NOT-FOUND-]   umpsjay[MARKER_CLOSING 108 &amp;lt;/a:t&gt;&amp;lt;/a:r&gt;]   </a:t>
+            </a:r>
+            <a:r>
+              <a:rPr lang="fr-FR" dirty="0" smtClean="0"/>
+              <a:t>[MARKER_OPENING 109 -ERR:REF-NOT-FOUND-]    overhay ethay [MARKER_CLOSING 110 &amp;lt;/a:t&gt;&amp;lt;/a:r&gt;]   </a:t>
+            </a:r>
+            <a:r>
+              <a:rPr lang="fr-FR" dirty="0" err="1" smtClean="0"/>
+              <a:t>[MARKER_OPENING 111 -ERR:REF-NOT-FOUND-]   azylay[MARKER_CLOSING 112 &amp;lt;/a:t&gt;&amp;lt;/a:r&gt;]   </a:t>
+            </a:r>
+            <a:r>
+              <a:rPr lang="fr-FR" dirty="0" smtClean="0"/>
+              <a:t>[MARKER_OPENING 113 -ERR:REF-NOT-FOUND-]    ogday. ethay uickqay [MARKER_CLOSING 114 &amp;lt;/a:t&gt;&amp;lt;/a:r&gt;]   </a:t>
+            </a:r>
+            <a:r>
+              <a:rPr lang="fr-FR" dirty="0" err="1" smtClean="0"/>
+              <a:t>[MARKER_OPENING 115 -ERR:REF-NOT-FOUND-]   ownbray[MARKER_CLOSING 116 &amp;lt;/a:t&gt;&amp;lt;/a:r&gt;]   </a:t>
+            </a:r>
+            <a:r>
+              <a:rPr lang="fr-FR" dirty="0" smtClean="0"/>
+              <a:t>[MARKER_OPENING 117 -ERR:REF-NOT-FOUND-]    oxfay [MARKER_CLOSING 118 &amp;lt;/a:t&gt;&amp;lt;/a:r&gt;]   </a:t>
+            </a:r>
+            <a:r>
+              <a:rPr lang="fr-FR" dirty="0" err="1" smtClean="0"/>
+              <a:t>[MARKER_OPENING 119 -ERR:REF-NOT-FOUND-]   umpsjay[MARKER_CLOSING 120 &amp;lt;/a:t&gt;&amp;lt;/a:r&gt;]   </a:t>
+            </a:r>
+            <a:r>
+              <a:rPr lang="fr-FR" dirty="0" smtClean="0"/>
+              <a:t>[MARKER_OPENING 121 -ERR:REF-NOT-FOUND-]    overhay ethay [MARKER_CLOSING 122 &amp;lt;/a:t&gt;&amp;lt;/a:r&gt;]   </a:t>
+            </a:r>
+            <a:r>
+              <a:rPr lang="fr-FR" dirty="0" err="1" smtClean="0"/>
+              <a:t>[MARKER_OPENING 123 -ERR:REF-NOT-FOUND-]   azylay[MARKER_CLOSING 124 &amp;lt;/a:t&gt;&amp;lt;/a:r&gt;]   </a:t>
+            </a:r>
+            <a:r>
+              <a:rPr lang="fr-FR" dirty="0" smtClean="0"/>
+              <a:t>[MARKER_OPENING 125 -ERR:REF-NOT-FOUND-]    ogday. [MARKER_CLOSING 126 &amp;lt;/a:t&gt;&amp;lt;/a:r&gt;]   </a:t>
             </a:r>
             <a:br>
               <a:rPr lang="fr-FR" dirty="0" smtClean="0"/>
@@ -3372,127 +3372,127 @@
             </a:br>
             <a:r>
               <a:rPr lang="fr-FR" dirty="0" smtClean="0"/>
-              <a:t>[MARKER_OPENING 130 -ERR:REF-NOT-FOUND-]   ethay uickqay [MARKER_CLOSING 131 &lt;/a:t&gt;&lt;/a:r&gt;]   </a:t>
-            </a:r>
-            <a:r>
-              <a:rPr lang="fr-FR" dirty="0" err="1" smtClean="0"/>
-              <a:t>[MARKER_OPENING 132 -ERR:REF-NOT-FOUND-]   ownbray[MARKER_CLOSING 133 &lt;/a:t&gt;&lt;/a:r&gt;]   </a:t>
-            </a:r>
-            <a:r>
-              <a:rPr lang="fr-FR" dirty="0" smtClean="0"/>
-              <a:t>[MARKER_OPENING 134 -ERR:REF-NOT-FOUND-]    oxfay [MARKER_CLOSING 135 &lt;/a:t&gt;&lt;/a:r&gt;]   </a:t>
-            </a:r>
-            <a:r>
-              <a:rPr lang="fr-FR" dirty="0" err="1" smtClean="0"/>
-              <a:t>[MARKER_OPENING 136 -ERR:REF-NOT-FOUND-]   umpsjay[MARKER_CLOSING 137 &lt;/a:t&gt;&lt;/a:r&gt;]   </a:t>
-            </a:r>
-            <a:r>
-              <a:rPr lang="fr-FR" dirty="0" smtClean="0"/>
-              <a:t>[MARKER_OPENING 138 -ERR:REF-NOT-FOUND-]    overhay ethay [MARKER_CLOSING 139 &lt;/a:t&gt;&lt;/a:r&gt;]   </a:t>
-            </a:r>
-            <a:r>
-              <a:rPr lang="fr-FR" dirty="0" err="1" smtClean="0"/>
-              <a:t>[MARKER_OPENING 140 -ERR:REF-NOT-FOUND-]   azylay[MARKER_CLOSING 141 &lt;/a:t&gt;&lt;/a:r&gt;]   </a:t>
-            </a:r>
-            <a:r>
-              <a:rPr lang="fr-FR" dirty="0" smtClean="0"/>
-              <a:t>[MARKER_OPENING 142 -ERR:REF-NOT-FOUND-]    ogday. ethay uickqay [MARKER_CLOSING 143 &lt;/a:t&gt;&lt;/a:r&gt;]   </a:t>
-            </a:r>
-            <a:r>
-              <a:rPr lang="fr-FR" dirty="0" err="1" smtClean="0"/>
-              <a:t>[MARKER_OPENING 144 -ERR:REF-NOT-FOUND-]   ownbray[MARKER_CLOSING 145 &lt;/a:t&gt;&lt;/a:r&gt;]   </a:t>
-            </a:r>
-            <a:r>
-              <a:rPr lang="fr-FR" dirty="0" smtClean="0"/>
-              <a:t>[MARKER_OPENING 146 -ERR:REF-NOT-FOUND-]    oxfay [MARKER_CLOSING 147 &lt;/a:t&gt;&lt;/a:r&gt;]   </a:t>
-            </a:r>
-            <a:r>
-              <a:rPr lang="fr-FR" dirty="0" err="1" smtClean="0"/>
-              <a:t>[MARKER_OPENING 148 -ERR:REF-NOT-FOUND-]   umpsjay[MARKER_CLOSING 149 &lt;/a:t&gt;&lt;/a:r&gt;]   </a:t>
-            </a:r>
-            <a:r>
-              <a:rPr lang="fr-FR" dirty="0" smtClean="0"/>
-              <a:t>[MARKER_OPENING 150 -ERR:REF-NOT-FOUND-]    overhay ethay [MARKER_CLOSING 151 &lt;/a:t&gt;&lt;/a:r&gt;]   </a:t>
-            </a:r>
-            <a:r>
-              <a:rPr lang="fr-FR" dirty="0" err="1" smtClean="0"/>
-              <a:t>[MARKER_OPENING 152 -ERR:REF-NOT-FOUND-]   azylay[MARKER_CLOSING 153 &lt;/a:t&gt;&lt;/a:r&gt;]   </a:t>
-            </a:r>
-            <a:r>
-              <a:rPr lang="fr-FR" dirty="0" smtClean="0"/>
-              <a:t>[MARKER_OPENING 154 -ERR:REF-NOT-FOUND-]    ogday. ethay uickqay [MARKER_CLOSING 155 &lt;/a:t&gt;&lt;/a:r&gt;]   </a:t>
-            </a:r>
-            <a:r>
-              <a:rPr lang="fr-FR" dirty="0" err="1" smtClean="0"/>
-              <a:t>[MARKER_OPENING 156 -ERR:REF-NOT-FOUND-]   ownbray[MARKER_CLOSING 157 &lt;/a:t&gt;&lt;/a:r&gt;]   </a:t>
-            </a:r>
-            <a:r>
-              <a:rPr lang="fr-FR" dirty="0" smtClean="0"/>
-              <a:t>[MARKER_OPENING 158 -ERR:REF-NOT-FOUND-]    oxfay [MARKER_CLOSING 159 &lt;/a:t&gt;&lt;/a:r&gt;]   </a:t>
-            </a:r>
-            <a:r>
-              <a:rPr lang="fr-FR" dirty="0" err="1" smtClean="0"/>
-              <a:t>[MARKER_OPENING 160 -ERR:REF-NOT-FOUND-]   umpsjay[MARKER_CLOSING 161 &lt;/a:t&gt;&lt;/a:r&gt;]   </a:t>
-            </a:r>
-            <a:r>
-              <a:rPr lang="fr-FR" dirty="0" smtClean="0"/>
-              <a:t>[MARKER_OPENING 162 -ERR:REF-NOT-FOUND-]    overhay ethay [MARKER_CLOSING 163 &lt;/a:t&gt;&lt;/a:r&gt;]   </a:t>
-            </a:r>
-            <a:r>
-              <a:rPr lang="fr-FR" dirty="0" err="1" smtClean="0"/>
-              <a:t>[MARKER_OPENING 164 -ERR:REF-NOT-FOUND-]   azylay[MARKER_CLOSING 165 &lt;/a:t&gt;&lt;/a:r&gt;]   </a:t>
-            </a:r>
-            <a:r>
-              <a:rPr lang="fr-FR" dirty="0" smtClean="0"/>
-              <a:t>[MARKER_OPENING 166 -ERR:REF-NOT-FOUND-]    ogday. ethay uickqay [MARKER_CLOSING 167 &lt;/a:t&gt;&lt;/a:r&gt;]   </a:t>
-            </a:r>
-            <a:r>
-              <a:rPr lang="fr-FR" dirty="0" err="1" smtClean="0"/>
-              <a:t>[MARKER_OPENING 168 -ERR:REF-NOT-FOUND-]   ownbray[MARKER_CLOSING 169 &lt;/a:t&gt;&lt;/a:r&gt;]   </a:t>
-            </a:r>
-            <a:r>
-              <a:rPr lang="fr-FR" dirty="0" smtClean="0"/>
-              <a:t>[MARKER_OPENING 170 -ERR:REF-NOT-FOUND-]    oxfay [MARKER_CLOSING 171 &lt;/a:t&gt;&lt;/a:r&gt;]   </a:t>
-            </a:r>
-            <a:r>
-              <a:rPr lang="fr-FR" dirty="0" err="1" smtClean="0"/>
-              <a:t>[MARKER_OPENING 172 -ERR:REF-NOT-FOUND-]   umpsjay[MARKER_CLOSING 173 &lt;/a:t&gt;&lt;/a:r&gt;]   </a:t>
-            </a:r>
-            <a:r>
-              <a:rPr lang="fr-FR" dirty="0" smtClean="0"/>
-              <a:t>[MARKER_OPENING 174 -ERR:REF-NOT-FOUND-]    overhay ethay [MARKER_CLOSING 175 &lt;/a:t&gt;&lt;/a:r&gt;]   </a:t>
-            </a:r>
-            <a:r>
-              <a:rPr lang="fr-FR" dirty="0" err="1" smtClean="0"/>
-              <a:t>[MARKER_OPENING 176 -ERR:REF-NOT-FOUND-]   azylay[MARKER_CLOSING 177 &lt;/a:t&gt;&lt;/a:r&gt;]   </a:t>
-            </a:r>
-            <a:r>
-              <a:rPr lang="fr-FR" dirty="0" smtClean="0"/>
-              <a:t>[MARKER_OPENING 178 -ERR:REF-NOT-FOUND-]    ogday. ethay uickqay [MARKER_CLOSING 179 &lt;/a:t&gt;&lt;/a:r&gt;]   </a:t>
-            </a:r>
-            <a:r>
-              <a:rPr lang="fr-FR" dirty="0" err="1" smtClean="0"/>
-              <a:t>[MARKER_OPENING 180 -ERR:REF-NOT-FOUND-]   ownbray[MARKER_CLOSING 181 &lt;/a:t&gt;&lt;/a:r&gt;]   </a:t>
-            </a:r>
-            <a:r>
-              <a:rPr lang="fr-FR" dirty="0" smtClean="0"/>
-              <a:t>[MARKER_OPENING 182 -ERR:REF-NOT-FOUND-]    oxfay [MARKER_CLOSING 183 &lt;/a:t&gt;&lt;/a:r&gt;]   </a:t>
-            </a:r>
-            <a:r>
-              <a:rPr lang="fr-FR" dirty="0" err="1" smtClean="0"/>
-              <a:t>[MARKER_OPENING 184 -ERR:REF-NOT-FOUND-]   umpsjay[MARKER_CLOSING 185 &lt;/a:t&gt;&lt;/a:r&gt;]   </a:t>
-            </a:r>
-            <a:r>
-              <a:rPr lang="fr-FR" dirty="0" smtClean="0"/>
-              <a:t>[MARKER_OPENING 186 -ERR:REF-NOT-FOUND-]    overhay ethay [MARKER_CLOSING 187 &lt;/a:t&gt;&lt;/a:r&gt;]   </a:t>
-            </a:r>
-            <a:r>
-              <a:rPr lang="fr-FR" dirty="0" err="1" smtClean="0"/>
-              <a:t>[MARKER_OPENING 188 -ERR:REF-NOT-FOUND-]   azylay[MARKER_CLOSING 189 &lt;/a:t&gt;&lt;/a:r&gt;]   </a:t>
-            </a:r>
-            <a:r>
-              <a:rPr lang="fr-FR" dirty="0" smtClean="0"/>
-              <a:t>[MARKER_OPENING 190 -ERR:REF-NOT-FOUND-]    ogday. [MARKER_CLOSING 191 &lt;/a:t&gt;&lt;/a:r&gt;]   </a:t>
+              <a:t>[MARKER_OPENING 130 -ERR:REF-NOT-FOUND-]   ethay uickqay [MARKER_CLOSING 131 &amp;lt;/a:t&gt;&amp;lt;/a:r&gt;]   </a:t>
+            </a:r>
+            <a:r>
+              <a:rPr lang="fr-FR" dirty="0" err="1" smtClean="0"/>
+              <a:t>[MARKER_OPENING 132 -ERR:REF-NOT-FOUND-]   ownbray[MARKER_CLOSING 133 &amp;lt;/a:t&gt;&amp;lt;/a:r&gt;]   </a:t>
+            </a:r>
+            <a:r>
+              <a:rPr lang="fr-FR" dirty="0" smtClean="0"/>
+              <a:t>[MARKER_OPENING 134 -ERR:REF-NOT-FOUND-]    oxfay [MARKER_CLOSING 135 &amp;lt;/a:t&gt;&amp;lt;/a:r&gt;]   </a:t>
+            </a:r>
+            <a:r>
+              <a:rPr lang="fr-FR" dirty="0" err="1" smtClean="0"/>
+              <a:t>[MARKER_OPENING 136 -ERR:REF-NOT-FOUND-]   umpsjay[MARKER_CLOSING 137 &amp;lt;/a:t&gt;&amp;lt;/a:r&gt;]   </a:t>
+            </a:r>
+            <a:r>
+              <a:rPr lang="fr-FR" dirty="0" smtClean="0"/>
+              <a:t>[MARKER_OPENING 138 -ERR:REF-NOT-FOUND-]    overhay ethay [MARKER_CLOSING 139 &amp;lt;/a:t&gt;&amp;lt;/a:r&gt;]   </a:t>
+            </a:r>
+            <a:r>
+              <a:rPr lang="fr-FR" dirty="0" err="1" smtClean="0"/>
+              <a:t>[MARKER_OPENING 140 -ERR:REF-NOT-FOUND-]   azylay[MARKER_CLOSING 141 &amp;lt;/a:t&gt;&amp;lt;/a:r&gt;]   </a:t>
+            </a:r>
+            <a:r>
+              <a:rPr lang="fr-FR" dirty="0" smtClean="0"/>
+              <a:t>[MARKER_OPENING 142 -ERR:REF-NOT-FOUND-]    ogday. ethay uickqay [MARKER_CLOSING 143 &amp;lt;/a:t&gt;&amp;lt;/a:r&gt;]   </a:t>
+            </a:r>
+            <a:r>
+              <a:rPr lang="fr-FR" dirty="0" err="1" smtClean="0"/>
+              <a:t>[MARKER_OPENING 144 -ERR:REF-NOT-FOUND-]   ownbray[MARKER_CLOSING 145 &amp;lt;/a:t&gt;&amp;lt;/a:r&gt;]   </a:t>
+            </a:r>
+            <a:r>
+              <a:rPr lang="fr-FR" dirty="0" smtClean="0"/>
+              <a:t>[MARKER_OPENING 146 -ERR:REF-NOT-FOUND-]    oxfay [MARKER_CLOSING 147 &amp;lt;/a:t&gt;&amp;lt;/a:r&gt;]   </a:t>
+            </a:r>
+            <a:r>
+              <a:rPr lang="fr-FR" dirty="0" err="1" smtClean="0"/>
+              <a:t>[MARKER_OPENING 148 -ERR:REF-NOT-FOUND-]   umpsjay[MARKER_CLOSING 149 &amp;lt;/a:t&gt;&amp;lt;/a:r&gt;]   </a:t>
+            </a:r>
+            <a:r>
+              <a:rPr lang="fr-FR" dirty="0" smtClean="0"/>
+              <a:t>[MARKER_OPENING 150 -ERR:REF-NOT-FOUND-]    overhay ethay [MARKER_CLOSING 151 &amp;lt;/a:t&gt;&amp;lt;/a:r&gt;]   </a:t>
+            </a:r>
+            <a:r>
+              <a:rPr lang="fr-FR" dirty="0" err="1" smtClean="0"/>
+              <a:t>[MARKER_OPENING 152 -ERR:REF-NOT-FOUND-]   azylay[MARKER_CLOSING 153 &amp;lt;/a:t&gt;&amp;lt;/a:r&gt;]   </a:t>
+            </a:r>
+            <a:r>
+              <a:rPr lang="fr-FR" dirty="0" smtClean="0"/>
+              <a:t>[MARKER_OPENING 154 -ERR:REF-NOT-FOUND-]    ogday. ethay uickqay [MARKER_CLOSING 155 &amp;lt;/a:t&gt;&amp;lt;/a:r&gt;]   </a:t>
+            </a:r>
+            <a:r>
+              <a:rPr lang="fr-FR" dirty="0" err="1" smtClean="0"/>
+              <a:t>[MARKER_OPENING 156 -ERR:REF-NOT-FOUND-]   ownbray[MARKER_CLOSING 157 &amp;lt;/a:t&gt;&amp;lt;/a:r&gt;]   </a:t>
+            </a:r>
+            <a:r>
+              <a:rPr lang="fr-FR" dirty="0" smtClean="0"/>
+              <a:t>[MARKER_OPENING 158 -ERR:REF-NOT-FOUND-]    oxfay [MARKER_CLOSING 159 &amp;lt;/a:t&gt;&amp;lt;/a:r&gt;]   </a:t>
+            </a:r>
+            <a:r>
+              <a:rPr lang="fr-FR" dirty="0" err="1" smtClean="0"/>
+              <a:t>[MARKER_OPENING 160 -ERR:REF-NOT-FOUND-]   umpsjay[MARKER_CLOSING 161 &amp;lt;/a:t&gt;&amp;lt;/a:r&gt;]   </a:t>
+            </a:r>
+            <a:r>
+              <a:rPr lang="fr-FR" dirty="0" smtClean="0"/>
+              <a:t>[MARKER_OPENING 162 -ERR:REF-NOT-FOUND-]    overhay ethay [MARKER_CLOSING 163 &amp;lt;/a:t&gt;&amp;lt;/a:r&gt;]   </a:t>
+            </a:r>
+            <a:r>
+              <a:rPr lang="fr-FR" dirty="0" err="1" smtClean="0"/>
+              <a:t>[MARKER_OPENING 164 -ERR:REF-NOT-FOUND-]   azylay[MARKER_CLOSING 165 &amp;lt;/a:t&gt;&amp;lt;/a:r&gt;]   </a:t>
+            </a:r>
+            <a:r>
+              <a:rPr lang="fr-FR" dirty="0" smtClean="0"/>
+              <a:t>[MARKER_OPENING 166 -ERR:REF-NOT-FOUND-]    ogday. ethay uickqay [MARKER_CLOSING 167 &amp;lt;/a:t&gt;&amp;lt;/a:r&gt;]   </a:t>
+            </a:r>
+            <a:r>
+              <a:rPr lang="fr-FR" dirty="0" err="1" smtClean="0"/>
+              <a:t>[MARKER_OPENING 168 -ERR:REF-NOT-FOUND-]   ownbray[MARKER_CLOSING 169 &amp;lt;/a:t&gt;&amp;lt;/a:r&gt;]   </a:t>
+            </a:r>
+            <a:r>
+              <a:rPr lang="fr-FR" dirty="0" smtClean="0"/>
+              <a:t>[MARKER_OPENING 170 -ERR:REF-NOT-FOUND-]    oxfay [MARKER_CLOSING 171 &amp;lt;/a:t&gt;&amp;lt;/a:r&gt;]   </a:t>
+            </a:r>
+            <a:r>
+              <a:rPr lang="fr-FR" dirty="0" err="1" smtClean="0"/>
+              <a:t>[MARKER_OPENING 172 -ERR:REF-NOT-FOUND-]   umpsjay[MARKER_CLOSING 173 &amp;lt;/a:t&gt;&amp;lt;/a:r&gt;]   </a:t>
+            </a:r>
+            <a:r>
+              <a:rPr lang="fr-FR" dirty="0" smtClean="0"/>
+              <a:t>[MARKER_OPENING 174 -ERR:REF-NOT-FOUND-]    overhay ethay [MARKER_CLOSING 175 &amp;lt;/a:t&gt;&amp;lt;/a:r&gt;]   </a:t>
+            </a:r>
+            <a:r>
+              <a:rPr lang="fr-FR" dirty="0" err="1" smtClean="0"/>
+              <a:t>[MARKER_OPENING 176 -ERR:REF-NOT-FOUND-]   azylay[MARKER_CLOSING 177 &amp;lt;/a:t&gt;&amp;lt;/a:r&gt;]   </a:t>
+            </a:r>
+            <a:r>
+              <a:rPr lang="fr-FR" dirty="0" smtClean="0"/>
+              <a:t>[MARKER_OPENING 178 -ERR:REF-NOT-FOUND-]    ogday. ethay uickqay [MARKER_CLOSING 179 &amp;lt;/a:t&gt;&amp;lt;/a:r&gt;]   </a:t>
+            </a:r>
+            <a:r>
+              <a:rPr lang="fr-FR" dirty="0" err="1" smtClean="0"/>
+              <a:t>[MARKER_OPENING 180 -ERR:REF-NOT-FOUND-]   ownbray[MARKER_CLOSING 181 &amp;lt;/a:t&gt;&amp;lt;/a:r&gt;]   </a:t>
+            </a:r>
+            <a:r>
+              <a:rPr lang="fr-FR" dirty="0" smtClean="0"/>
+              <a:t>[MARKER_OPENING 182 -ERR:REF-NOT-FOUND-]    oxfay [MARKER_CLOSING 183 &amp;lt;/a:t&gt;&amp;lt;/a:r&gt;]   </a:t>
+            </a:r>
+            <a:r>
+              <a:rPr lang="fr-FR" dirty="0" err="1" smtClean="0"/>
+              <a:t>[MARKER_OPENING 184 -ERR:REF-NOT-FOUND-]   umpsjay[MARKER_CLOSING 185 &amp;lt;/a:t&gt;&amp;lt;/a:r&gt;]   </a:t>
+            </a:r>
+            <a:r>
+              <a:rPr lang="fr-FR" dirty="0" smtClean="0"/>
+              <a:t>[MARKER_OPENING 186 -ERR:REF-NOT-FOUND-]    overhay ethay [MARKER_CLOSING 187 &amp;lt;/a:t&gt;&amp;lt;/a:r&gt;]   </a:t>
+            </a:r>
+            <a:r>
+              <a:rPr lang="fr-FR" dirty="0" err="1" smtClean="0"/>
+              <a:t>[MARKER_OPENING 188 -ERR:REF-NOT-FOUND-]   azylay[MARKER_CLOSING 189 &amp;lt;/a:t&gt;&amp;lt;/a:r&gt;]   </a:t>
+            </a:r>
+            <a:r>
+              <a:rPr lang="fr-FR" dirty="0" smtClean="0"/>
+              <a:t>[MARKER_OPENING 190 -ERR:REF-NOT-FOUND-]    ogday. [MARKER_CLOSING 191 &amp;lt;/a:t&gt;&amp;lt;/a:r&gt;]   </a:t>
             </a:r>
             <a:br>
               <a:rPr lang="fr-FR" dirty="0" smtClean="0"/>

</xml_diff>

<commit_message>
Preserve space automatically, and remove a few more opening and closing markers.
git-svn-id: https://okapi.googlecode.com/svn/trunk@2008 0cd2bb99-014b-0410-b875-5d0485b745ed
</commit_message>
<xml_diff>
--- a/filters/net.sf.okapi.filters.openxml.tests/gold/Peeksample.pptx
+++ b/filters/net.sf.okapi.filters.openxml.tests/gold/Peeksample.pptx
@@ -2584,7 +2584,7 @@
           <a:p>
             <a:r>
               <a:rPr lang="en-US" smtClean="0"/>
-              <a:t>Click to edit Master title style</a:t>
+              <a:t>[MARKER_OPENING 0 -ERR:REF-NOT-FOUND-]   ickclay otay edithay astermay itletay estylay[MARKER_CLOSING 1 &amp;lt;/a:t&gt;&amp;lt;/a:r&gt;]   </a:t>
             </a:r>
             <a:endParaRPr lang="en-US"/>
           </a:p>
@@ -2618,35 +2618,35 @@
             <a:pPr lvl="0"/>
             <a:r>
               <a:rPr lang="en-US" smtClean="0"/>
-              <a:t>Click to edit Master text styles</a:t>
+              <a:t>[MARKER_OPENING 0 -ERR:REF-NOT-FOUND-]   ickclay otay edithay astermay exttay esstylay[MARKER_CLOSING 1 &amp;lt;/a:t&gt;&amp;lt;/a:r&gt;]   </a:t>
             </a:r>
           </a:p>
           <a:p>
             <a:pPr lvl="1"/>
             <a:r>
               <a:rPr lang="en-US" smtClean="0"/>
-              <a:t>Second level</a:t>
+              <a:t>[MARKER_OPENING 0 -ERR:REF-NOT-FOUND-]   econdsay evellay[MARKER_CLOSING 1 &amp;lt;/a:t&gt;&amp;lt;/a:r&gt;]   </a:t>
             </a:r>
           </a:p>
           <a:p>
             <a:pPr lvl="2"/>
             <a:r>
               <a:rPr lang="en-US" smtClean="0"/>
-              <a:t>Third level</a:t>
+              <a:t>[MARKER_OPENING 0 -ERR:REF-NOT-FOUND-]   irdthay evellay[MARKER_CLOSING 1 &amp;lt;/a:t&gt;&amp;lt;/a:r&gt;]   </a:t>
             </a:r>
           </a:p>
           <a:p>
             <a:pPr lvl="3"/>
             <a:r>
               <a:rPr lang="en-US" smtClean="0"/>
-              <a:t>Fourth level</a:t>
+              <a:t>[MARKER_OPENING 0 -ERR:REF-NOT-FOUND-]   ourthfay evellay[MARKER_CLOSING 1 &amp;lt;/a:t&gt;&amp;lt;/a:r&gt;]   </a:t>
             </a:r>
           </a:p>
           <a:p>
             <a:pPr lvl="4"/>
             <a:r>
               <a:rPr lang="en-US" smtClean="0"/>
-              <a:t>Fifth level</a:t>
+              <a:t>[MARKER_OPENING 0 -ERR:REF-NOT-FOUND-]   ifthfay evellay[MARKER_CLOSING 1 &amp;lt;/a:t&gt;&amp;lt;/a:r&gt;]   </a:t>
             </a:r>
             <a:endParaRPr lang="en-US"/>
           </a:p>
@@ -2688,7 +2688,7 @@
             <a:fld id="{1D8BD707-D9CF-40AE-B4C6-C98DA3205C09}" type="datetimeFigureOut">
               <a:rPr lang="en-US" smtClean="0"/>
               <a:pPr/>
-              <a:t>3/1/2007</a:t>
+              <a:t>[MARKER_OPENING 0 -ERR:REF-NOT-FOUND-]   3/1/2007[MARKER_CLOSING 1 &amp;lt;/a:t&gt;&amp;lt;/a:fld&gt;]   </a:t>
             </a:fld>
             <a:endParaRPr lang="en-US"/>
           </a:p>
@@ -2767,7 +2767,7 @@
             <a:fld id="{B6F15528-21DE-4FAA-801E-634DDDAF4B2B}" type="slidenum">
               <a:rPr lang="en-US" smtClean="0"/>
               <a:pPr/>
-              <a:t>‹#›</a:t>
+              <a:t>[MARKER_OPENING 0 -ERR:REF-NOT-FOUND-]   ‹#›[MARKER_CLOSING 1 &amp;lt;/a:t&gt;&amp;lt;/a:fld&gt;]   </a:t>
             </a:fld>
             <a:endParaRPr lang="en-US"/>
           </a:p>

</xml_diff>

<commit_message>
Fixes broken references in tests
git-svn-id: https://okapi.googlecode.com/svn/trunk@2532 0cd2bb99-014b-0410-b875-5d0485b745ed
</commit_message>
<xml_diff>
--- a/filters/net.sf.okapi.filters.openxml.tests/gold/Peeksample.pptx
+++ b/filters/net.sf.okapi.filters.openxml.tests/gold/Peeksample.pptx
@@ -2584,7 +2584,7 @@
           <a:p>
             <a:r>
               <a:rPr lang="en-US" smtClean="0"/>
-              <a:t>{g0:-ERR:REF-NOT-FOUND-}ickclay otay edithay astermay itletay estylay{/g1:&lt;/a:t&gt;&lt;/a:r&gt;}</a:t>
+              <a:t>{g0:&lt;a:r&gt;&lt;a:rPr lang="en-US" smtClean="0"/&gt;&lt;a:t&gt;}ickclay otay edithay astermay itletay estylay{/g1:&lt;/a:t&gt;&lt;/a:r&gt;}</a:t>
             </a:r>
             <a:endParaRPr lang="en-US"/>
           </a:p>
@@ -2618,35 +2618,35 @@
             <a:pPr lvl="0"/>
             <a:r>
               <a:rPr lang="en-US" smtClean="0"/>
-              <a:t>{g0:-ERR:REF-NOT-FOUND-}ickclay otay edithay astermay exttay esstylay{/g1:&lt;/a:t&gt;&lt;/a:r&gt;}</a:t>
+              <a:t>{g0:&lt;a:r&gt;&lt;a:rPr lang="en-US" smtClean="0"/&gt;&lt;a:t&gt;}ickclay otay edithay astermay exttay esstylay{/g1:&lt;/a:t&gt;&lt;/a:r&gt;}</a:t>
             </a:r>
           </a:p>
           <a:p>
             <a:pPr lvl="1"/>
             <a:r>
               <a:rPr lang="en-US" smtClean="0"/>
-              <a:t>{g0:-ERR:REF-NOT-FOUND-}econdsay evellay{/g1:&lt;/a:t&gt;&lt;/a:r&gt;}</a:t>
+              <a:t>{g0:&lt;a:r&gt;&lt;a:rPr lang="en-US" smtClean="0"/&gt;&lt;a:t&gt;}econdsay evellay{/g1:&lt;/a:t&gt;&lt;/a:r&gt;}</a:t>
             </a:r>
           </a:p>
           <a:p>
             <a:pPr lvl="2"/>
             <a:r>
               <a:rPr lang="en-US" smtClean="0"/>
-              <a:t>{g0:-ERR:REF-NOT-FOUND-}irdthay evellay{/g1:&lt;/a:t&gt;&lt;/a:r&gt;}</a:t>
+              <a:t>{g0:&lt;a:r&gt;&lt;a:rPr lang="en-US" smtClean="0"/&gt;&lt;a:t&gt;}irdthay evellay{/g1:&lt;/a:t&gt;&lt;/a:r&gt;}</a:t>
             </a:r>
           </a:p>
           <a:p>
             <a:pPr lvl="3"/>
             <a:r>
               <a:rPr lang="en-US" smtClean="0"/>
-              <a:t>{g0:-ERR:REF-NOT-FOUND-}ourthfay evellay{/g1:&lt;/a:t&gt;&lt;/a:r&gt;}</a:t>
+              <a:t>{g0:&lt;a:r&gt;&lt;a:rPr lang="en-US" smtClean="0"/&gt;&lt;a:t&gt;}ourthfay evellay{/g1:&lt;/a:t&gt;&lt;/a:r&gt;}</a:t>
             </a:r>
           </a:p>
           <a:p>
             <a:pPr lvl="4"/>
             <a:r>
               <a:rPr lang="en-US" smtClean="0"/>
-              <a:t>{g0:-ERR:REF-NOT-FOUND-}ifthfay evellay{/g1:&lt;/a:t&gt;&lt;/a:r&gt;}</a:t>
+              <a:t>{g0:&lt;a:r&gt;&lt;a:rPr lang="en-US" smtClean="0"/&gt;&lt;a:t&gt;}ifthfay evellay{/g1:&lt;/a:t&gt;&lt;/a:r&gt;}</a:t>
             </a:r>
             <a:endParaRPr lang="en-US"/>
           </a:p>
@@ -2688,7 +2688,7 @@
             <a:fld id="{1D8BD707-D9CF-40AE-B4C6-C98DA3205C09}" type="datetimeFigureOut">
               <a:rPr lang="en-US" smtClean="0"/>
               <a:pPr/>
-              <a:t>{g0:-ERR:REF-NOT-FOUND-}3/1/2007{/g1:&lt;/a:t&gt;&lt;/a:fld&gt;}</a:t>
+              <a:t>{g0:&lt;a:fld id="{1D8BD707-D9CF-40AE-B4C6-C98DA3205C09}" type="datetimeFigureOut"&gt;&lt;a:rPr lang="en-US" smtClean="0"/&gt;&lt;a:pPr/&gt;&lt;a:t&gt;}3/1/2007{/g1:&lt;/a:t&gt;&lt;/a:fld&gt;}</a:t>
             </a:fld>
             <a:endParaRPr lang="en-US"/>
           </a:p>
@@ -2767,7 +2767,7 @@
             <a:fld id="{B6F15528-21DE-4FAA-801E-634DDDAF4B2B}" type="slidenum">
               <a:rPr lang="en-US" smtClean="0"/>
               <a:pPr/>
-              <a:t>{g0:-ERR:REF-NOT-FOUND-}‹#›{/g1:&lt;/a:t&gt;&lt;/a:fld&gt;}</a:t>
+              <a:t>{g0:&lt;a:fld id="{B6F15528-21DE-4FAA-801E-634DDDAF4B2B}" type="slidenum"&gt;&lt;a:rPr lang="en-US" smtClean="0"/&gt;&lt;a:pPr/&gt;&lt;a:t&gt;}‹#›{/g1:&lt;/a:t&gt;&lt;/a:fld&gt;}</a:t>
             </a:fld>
             <a:endParaRPr lang="en-US"/>
           </a:p>
@@ -3076,7 +3076,7 @@
           <a:p>
             <a:r>
               <a:rPr lang="fr-FR" dirty="0" smtClean="0"/>
-              <a:t>{g0:-ERR:REF-NOT-FOUND-}=andray(){/g1:&lt;/a:t&gt;&lt;/a:r&gt;}</a:t>
+              <a:t>{g0:&lt;a:r&gt;&lt;a:rPr lang="fr-FR" dirty="0" smtClean="0"/&gt;&lt;a:t&gt;}=andray(){/g1:&lt;/a:t&gt;&lt;/a:r&gt;}</a:t>
             </a:r>
             <a:endParaRPr lang="fr-FR" dirty="0"/>
           </a:p>
@@ -3104,127 +3104,127 @@
             </a:pPr>
             <a:r>
               <a:rPr lang="fr-FR" dirty="0" smtClean="0"/>
-              <a:t>{g0:-ERR:REF-NOT-FOUND-}ethay uickqay {/g1:&lt;/a:t&gt;&lt;/a:r&gt;}</a:t>
-            </a:r>
-            <a:r>
-              <a:rPr lang="fr-FR" dirty="0" err="1" smtClean="0"/>
-              <a:t>{g2:-ERR:REF-NOT-FOUND-}ownbray{/g3:&lt;/a:t&gt;&lt;/a:r&gt;}</a:t>
-            </a:r>
-            <a:r>
-              <a:rPr lang="fr-FR" dirty="0" smtClean="0"/>
-              <a:t>{g4:-ERR:REF-NOT-FOUND-} oxfay {/g5:&lt;/a:t&gt;&lt;/a:r&gt;}</a:t>
-            </a:r>
-            <a:r>
-              <a:rPr lang="fr-FR" dirty="0" err="1" smtClean="0"/>
-              <a:t>{g6:-ERR:REF-NOT-FOUND-}umpsjay{/g7:&lt;/a:t&gt;&lt;/a:r&gt;}</a:t>
-            </a:r>
-            <a:r>
-              <a:rPr lang="fr-FR" dirty="0" smtClean="0"/>
-              <a:t>{g8:-ERR:REF-NOT-FOUND-} overhay ethay {/g9:&lt;/a:t&gt;&lt;/a:r&gt;}</a:t>
-            </a:r>
-            <a:r>
-              <a:rPr lang="fr-FR" dirty="0" err="1" smtClean="0"/>
-              <a:t>{g10:-ERR:REF-NOT-FOUND-}azylay{/g11:&lt;/a:t&gt;&lt;/a:r&gt;}</a:t>
-            </a:r>
-            <a:r>
-              <a:rPr lang="fr-FR" dirty="0" smtClean="0"/>
-              <a:t>{g12:-ERR:REF-NOT-FOUND-} ogday. ethay uickqay {/g13:&lt;/a:t&gt;&lt;/a:r&gt;}</a:t>
-            </a:r>
-            <a:r>
-              <a:rPr lang="fr-FR" dirty="0" err="1" smtClean="0"/>
-              <a:t>{g14:-ERR:REF-NOT-FOUND-}ownbray{/g15:&lt;/a:t&gt;&lt;/a:r&gt;}</a:t>
-            </a:r>
-            <a:r>
-              <a:rPr lang="fr-FR" dirty="0" smtClean="0"/>
-              <a:t>{g16:-ERR:REF-NOT-FOUND-} oxfay {/g17:&lt;/a:t&gt;&lt;/a:r&gt;}</a:t>
-            </a:r>
-            <a:r>
-              <a:rPr lang="fr-FR" dirty="0" err="1" smtClean="0"/>
-              <a:t>{g18:-ERR:REF-NOT-FOUND-}umpsjay{/g19:&lt;/a:t&gt;&lt;/a:r&gt;}</a:t>
-            </a:r>
-            <a:r>
-              <a:rPr lang="fr-FR" dirty="0" smtClean="0"/>
-              <a:t>{g20:-ERR:REF-NOT-FOUND-} overhay ethay {/g21:&lt;/a:t&gt;&lt;/a:r&gt;}</a:t>
-            </a:r>
-            <a:r>
-              <a:rPr lang="fr-FR" dirty="0" err="1" smtClean="0"/>
-              <a:t>{g22:-ERR:REF-NOT-FOUND-}azylay{/g23:&lt;/a:t&gt;&lt;/a:r&gt;}</a:t>
-            </a:r>
-            <a:r>
-              <a:rPr lang="fr-FR" dirty="0" smtClean="0"/>
-              <a:t>{g24:-ERR:REF-NOT-FOUND-} ogday. ethay uickqay {/g25:&lt;/a:t&gt;&lt;/a:r&gt;}</a:t>
-            </a:r>
-            <a:r>
-              <a:rPr lang="fr-FR" dirty="0" err="1" smtClean="0"/>
-              <a:t>{g26:-ERR:REF-NOT-FOUND-}ownbray{/g27:&lt;/a:t&gt;&lt;/a:r&gt;}</a:t>
-            </a:r>
-            <a:r>
-              <a:rPr lang="fr-FR" dirty="0" smtClean="0"/>
-              <a:t>{g28:-ERR:REF-NOT-FOUND-} oxfay {/g29:&lt;/a:t&gt;&lt;/a:r&gt;}</a:t>
-            </a:r>
-            <a:r>
-              <a:rPr lang="fr-FR" dirty="0" err="1" smtClean="0"/>
-              <a:t>{g30:-ERR:REF-NOT-FOUND-}umpsjay{/g31:&lt;/a:t&gt;&lt;/a:r&gt;}</a:t>
-            </a:r>
-            <a:r>
-              <a:rPr lang="fr-FR" dirty="0" smtClean="0"/>
-              <a:t>{g32:-ERR:REF-NOT-FOUND-} overhay ethay {/g33:&lt;/a:t&gt;&lt;/a:r&gt;}</a:t>
-            </a:r>
-            <a:r>
-              <a:rPr lang="fr-FR" dirty="0" err="1" smtClean="0"/>
-              <a:t>{g34:-ERR:REF-NOT-FOUND-}azylay{/g35:&lt;/a:t&gt;&lt;/a:r&gt;}</a:t>
-            </a:r>
-            <a:r>
-              <a:rPr lang="fr-FR" dirty="0" smtClean="0"/>
-              <a:t>{g36:-ERR:REF-NOT-FOUND-} ogday. ethay uickqay {/g37:&lt;/a:t&gt;&lt;/a:r&gt;}</a:t>
-            </a:r>
-            <a:r>
-              <a:rPr lang="fr-FR" dirty="0" err="1" smtClean="0"/>
-              <a:t>{g38:-ERR:REF-NOT-FOUND-}ownbray{/g39:&lt;/a:t&gt;&lt;/a:r&gt;}</a:t>
-            </a:r>
-            <a:r>
-              <a:rPr lang="fr-FR" dirty="0" smtClean="0"/>
-              <a:t>{g40:-ERR:REF-NOT-FOUND-} oxfay {/g41:&lt;/a:t&gt;&lt;/a:r&gt;}</a:t>
-            </a:r>
-            <a:r>
-              <a:rPr lang="fr-FR" dirty="0" err="1" smtClean="0"/>
-              <a:t>{g42:-ERR:REF-NOT-FOUND-}umpsjay{/g43:&lt;/a:t&gt;&lt;/a:r&gt;}</a:t>
-            </a:r>
-            <a:r>
-              <a:rPr lang="fr-FR" dirty="0" smtClean="0"/>
-              <a:t>{g44:-ERR:REF-NOT-FOUND-} overhay ethay {/g45:&lt;/a:t&gt;&lt;/a:r&gt;}</a:t>
-            </a:r>
-            <a:r>
-              <a:rPr lang="fr-FR" dirty="0" err="1" smtClean="0"/>
-              <a:t>{g46:-ERR:REF-NOT-FOUND-}azylay{/g47:&lt;/a:t&gt;&lt;/a:r&gt;}</a:t>
-            </a:r>
-            <a:r>
-              <a:rPr lang="fr-FR" dirty="0" smtClean="0"/>
-              <a:t>{g48:-ERR:REF-NOT-FOUND-} ogday. ethay uickqay {/g49:&lt;/a:t&gt;&lt;/a:r&gt;}</a:t>
-            </a:r>
-            <a:r>
-              <a:rPr lang="fr-FR" dirty="0" err="1" smtClean="0"/>
-              <a:t>{g50:-ERR:REF-NOT-FOUND-}ownbray{/g51:&lt;/a:t&gt;&lt;/a:r&gt;}</a:t>
-            </a:r>
-            <a:r>
-              <a:rPr lang="fr-FR" dirty="0" smtClean="0"/>
-              <a:t>{g52:-ERR:REF-NOT-FOUND-} oxfay {/g53:&lt;/a:t&gt;&lt;/a:r&gt;}</a:t>
-            </a:r>
-            <a:r>
-              <a:rPr lang="fr-FR" dirty="0" err="1" smtClean="0"/>
-              <a:t>{g54:-ERR:REF-NOT-FOUND-}umpsjay{/g55:&lt;/a:t&gt;&lt;/a:r&gt;}</a:t>
-            </a:r>
-            <a:r>
-              <a:rPr lang="fr-FR" dirty="0" smtClean="0"/>
-              <a:t>{g56:-ERR:REF-NOT-FOUND-} overhay ethay {/g57:&lt;/a:t&gt;&lt;/a:r&gt;}</a:t>
-            </a:r>
-            <a:r>
-              <a:rPr lang="fr-FR" dirty="0" err="1" smtClean="0"/>
-              <a:t>{g58:-ERR:REF-NOT-FOUND-}azylay{/g59:&lt;/a:t&gt;&lt;/a:r&gt;}</a:t>
-            </a:r>
-            <a:r>
-              <a:rPr lang="fr-FR" dirty="0" smtClean="0"/>
-              <a:t>{g60:-ERR:REF-NOT-FOUND-} ogday. {/g61:&lt;/a:t&gt;&lt;/a:r&gt;}</a:t>
+              <a:t>{g0:&lt;a:r&gt;&lt;a:rPr lang="fr-FR" dirty="0" smtClean="0"/&gt;&lt;a:t&gt;}ethay uickqay {/g1:&lt;/a:t&gt;&lt;/a:r&gt;}</a:t>
+            </a:r>
+            <a:r>
+              <a:rPr lang="fr-FR" dirty="0" err="1" smtClean="0"/>
+              <a:t>{g2:&lt;a:r&gt;&lt;a:rPr lang="fr-FR" dirty="0" err="1" smtClean="0"/&gt;&lt;a:t&gt;}ownbray{/g3:&lt;/a:t&gt;&lt;/a:r&gt;}</a:t>
+            </a:r>
+            <a:r>
+              <a:rPr lang="fr-FR" dirty="0" smtClean="0"/>
+              <a:t>{g4:&lt;a:r&gt;&lt;a:rPr lang="fr-FR" dirty="0" smtClean="0"/&gt;&lt;a:t&gt;} oxfay {/g5:&lt;/a:t&gt;&lt;/a:r&gt;}</a:t>
+            </a:r>
+            <a:r>
+              <a:rPr lang="fr-FR" dirty="0" err="1" smtClean="0"/>
+              <a:t>{g6:&lt;a:r&gt;&lt;a:rPr lang="fr-FR" dirty="0" err="1" smtClean="0"/&gt;&lt;a:t&gt;}umpsjay{/g7:&lt;/a:t&gt;&lt;/a:r&gt;}</a:t>
+            </a:r>
+            <a:r>
+              <a:rPr lang="fr-FR" dirty="0" smtClean="0"/>
+              <a:t>{g8:&lt;a:r&gt;&lt;a:rPr lang="fr-FR" dirty="0" smtClean="0"/&gt;&lt;a:t&gt;} overhay ethay {/g9:&lt;/a:t&gt;&lt;/a:r&gt;}</a:t>
+            </a:r>
+            <a:r>
+              <a:rPr lang="fr-FR" dirty="0" err="1" smtClean="0"/>
+              <a:t>{g10:&lt;a:r&gt;&lt;a:rPr lang="fr-FR" dirty="0" err="1" smtClean="0"/&gt;&lt;a:t&gt;}azylay{/g11:&lt;/a:t&gt;&lt;/a:r&gt;}</a:t>
+            </a:r>
+            <a:r>
+              <a:rPr lang="fr-FR" dirty="0" smtClean="0"/>
+              <a:t>{g12:&lt;a:r&gt;&lt;a:rPr lang="fr-FR" dirty="0" smtClean="0"/&gt;&lt;a:t&gt;} ogday. ethay uickqay {/g13:&lt;/a:t&gt;&lt;/a:r&gt;}</a:t>
+            </a:r>
+            <a:r>
+              <a:rPr lang="fr-FR" dirty="0" err="1" smtClean="0"/>
+              <a:t>{g14:&lt;a:r&gt;&lt;a:rPr lang="fr-FR" dirty="0" err="1" smtClean="0"/&gt;&lt;a:t&gt;}ownbray{/g15:&lt;/a:t&gt;&lt;/a:r&gt;}</a:t>
+            </a:r>
+            <a:r>
+              <a:rPr lang="fr-FR" dirty="0" smtClean="0"/>
+              <a:t>{g16:&lt;a:r&gt;&lt;a:rPr lang="fr-FR" dirty="0" smtClean="0"/&gt;&lt;a:t&gt;} oxfay {/g17:&lt;/a:t&gt;&lt;/a:r&gt;}</a:t>
+            </a:r>
+            <a:r>
+              <a:rPr lang="fr-FR" dirty="0" err="1" smtClean="0"/>
+              <a:t>{g18:&lt;a:r&gt;&lt;a:rPr lang="fr-FR" dirty="0" err="1" smtClean="0"/&gt;&lt;a:t&gt;}umpsjay{/g19:&lt;/a:t&gt;&lt;/a:r&gt;}</a:t>
+            </a:r>
+            <a:r>
+              <a:rPr lang="fr-FR" dirty="0" smtClean="0"/>
+              <a:t>{g20:&lt;a:r&gt;&lt;a:rPr lang="fr-FR" dirty="0" smtClean="0"/&gt;&lt;a:t&gt;} overhay ethay {/g21:&lt;/a:t&gt;&lt;/a:r&gt;}</a:t>
+            </a:r>
+            <a:r>
+              <a:rPr lang="fr-FR" dirty="0" err="1" smtClean="0"/>
+              <a:t>{g22:&lt;a:r&gt;&lt;a:rPr lang="fr-FR" dirty="0" err="1" smtClean="0"/&gt;&lt;a:t&gt;}azylay{/g23:&lt;/a:t&gt;&lt;/a:r&gt;}</a:t>
+            </a:r>
+            <a:r>
+              <a:rPr lang="fr-FR" dirty="0" smtClean="0"/>
+              <a:t>{g24:&lt;a:r&gt;&lt;a:rPr lang="fr-FR" dirty="0" smtClean="0"/&gt;&lt;a:t&gt;} ogday. ethay uickqay {/g25:&lt;/a:t&gt;&lt;/a:r&gt;}</a:t>
+            </a:r>
+            <a:r>
+              <a:rPr lang="fr-FR" dirty="0" err="1" smtClean="0"/>
+              <a:t>{g26:&lt;a:r&gt;&lt;a:rPr lang="fr-FR" dirty="0" err="1" smtClean="0"/&gt;&lt;a:t&gt;}ownbray{/g27:&lt;/a:t&gt;&lt;/a:r&gt;}</a:t>
+            </a:r>
+            <a:r>
+              <a:rPr lang="fr-FR" dirty="0" smtClean="0"/>
+              <a:t>{g28:&lt;a:r&gt;&lt;a:rPr lang="fr-FR" dirty="0" smtClean="0"/&gt;&lt;a:t&gt;} oxfay {/g29:&lt;/a:t&gt;&lt;/a:r&gt;}</a:t>
+            </a:r>
+            <a:r>
+              <a:rPr lang="fr-FR" dirty="0" err="1" smtClean="0"/>
+              <a:t>{g30:&lt;a:r&gt;&lt;a:rPr lang="fr-FR" dirty="0" err="1" smtClean="0"/&gt;&lt;a:t&gt;}umpsjay{/g31:&lt;/a:t&gt;&lt;/a:r&gt;}</a:t>
+            </a:r>
+            <a:r>
+              <a:rPr lang="fr-FR" dirty="0" smtClean="0"/>
+              <a:t>{g32:&lt;a:r&gt;&lt;a:rPr lang="fr-FR" dirty="0" smtClean="0"/&gt;&lt;a:t&gt;} overhay ethay {/g33:&lt;/a:t&gt;&lt;/a:r&gt;}</a:t>
+            </a:r>
+            <a:r>
+              <a:rPr lang="fr-FR" dirty="0" err="1" smtClean="0"/>
+              <a:t>{g34:&lt;a:r&gt;&lt;a:rPr lang="fr-FR" dirty="0" err="1" smtClean="0"/&gt;&lt;a:t&gt;}azylay{/g35:&lt;/a:t&gt;&lt;/a:r&gt;}</a:t>
+            </a:r>
+            <a:r>
+              <a:rPr lang="fr-FR" dirty="0" smtClean="0"/>
+              <a:t>{g36:&lt;a:r&gt;&lt;a:rPr lang="fr-FR" dirty="0" smtClean="0"/&gt;&lt;a:t&gt;} ogday. ethay uickqay {/g37:&lt;/a:t&gt;&lt;/a:r&gt;}</a:t>
+            </a:r>
+            <a:r>
+              <a:rPr lang="fr-FR" dirty="0" err="1" smtClean="0"/>
+              <a:t>{g38:&lt;a:r&gt;&lt;a:rPr lang="fr-FR" dirty="0" err="1" smtClean="0"/&gt;&lt;a:t&gt;}ownbray{/g39:&lt;/a:t&gt;&lt;/a:r&gt;}</a:t>
+            </a:r>
+            <a:r>
+              <a:rPr lang="fr-FR" dirty="0" smtClean="0"/>
+              <a:t>{g40:&lt;a:r&gt;&lt;a:rPr lang="fr-FR" dirty="0" smtClean="0"/&gt;&lt;a:t&gt;} oxfay {/g41:&lt;/a:t&gt;&lt;/a:r&gt;}</a:t>
+            </a:r>
+            <a:r>
+              <a:rPr lang="fr-FR" dirty="0" err="1" smtClean="0"/>
+              <a:t>{g42:&lt;a:r&gt;&lt;a:rPr lang="fr-FR" dirty="0" err="1" smtClean="0"/&gt;&lt;a:t&gt;}umpsjay{/g43:&lt;/a:t&gt;&lt;/a:r&gt;}</a:t>
+            </a:r>
+            <a:r>
+              <a:rPr lang="fr-FR" dirty="0" smtClean="0"/>
+              <a:t>{g44:&lt;a:r&gt;&lt;a:rPr lang="fr-FR" dirty="0" smtClean="0"/&gt;&lt;a:t&gt;} overhay ethay {/g45:&lt;/a:t&gt;&lt;/a:r&gt;}</a:t>
+            </a:r>
+            <a:r>
+              <a:rPr lang="fr-FR" dirty="0" err="1" smtClean="0"/>
+              <a:t>{g46:&lt;a:r&gt;&lt;a:rPr lang="fr-FR" dirty="0" err="1" smtClean="0"/&gt;&lt;a:t&gt;}azylay{/g47:&lt;/a:t&gt;&lt;/a:r&gt;}</a:t>
+            </a:r>
+            <a:r>
+              <a:rPr lang="fr-FR" dirty="0" smtClean="0"/>
+              <a:t>{g48:&lt;a:r&gt;&lt;a:rPr lang="fr-FR" dirty="0" smtClean="0"/&gt;&lt;a:t&gt;} ogday. ethay uickqay {/g49:&lt;/a:t&gt;&lt;/a:r&gt;}</a:t>
+            </a:r>
+            <a:r>
+              <a:rPr lang="fr-FR" dirty="0" err="1" smtClean="0"/>
+              <a:t>{g50:&lt;a:r&gt;&lt;a:rPr lang="fr-FR" dirty="0" err="1" smtClean="0"/&gt;&lt;a:t&gt;}ownbray{/g51:&lt;/a:t&gt;&lt;/a:r&gt;}</a:t>
+            </a:r>
+            <a:r>
+              <a:rPr lang="fr-FR" dirty="0" smtClean="0"/>
+              <a:t>{g52:&lt;a:r&gt;&lt;a:rPr lang="fr-FR" dirty="0" smtClean="0"/&gt;&lt;a:t&gt;} oxfay {/g53:&lt;/a:t&gt;&lt;/a:r&gt;}</a:t>
+            </a:r>
+            <a:r>
+              <a:rPr lang="fr-FR" dirty="0" err="1" smtClean="0"/>
+              <a:t>{g54:&lt;a:r&gt;&lt;a:rPr lang="fr-FR" dirty="0" err="1" smtClean="0"/&gt;&lt;a:t&gt;}umpsjay{/g55:&lt;/a:t&gt;&lt;/a:r&gt;}</a:t>
+            </a:r>
+            <a:r>
+              <a:rPr lang="fr-FR" dirty="0" smtClean="0"/>
+              <a:t>{g56:&lt;a:r&gt;&lt;a:rPr lang="fr-FR" dirty="0" smtClean="0"/&gt;&lt;a:t&gt;} overhay ethay {/g57:&lt;/a:t&gt;&lt;/a:r&gt;}</a:t>
+            </a:r>
+            <a:r>
+              <a:rPr lang="fr-FR" dirty="0" err="1" smtClean="0"/>
+              <a:t>{g58:&lt;a:r&gt;&lt;a:rPr lang="fr-FR" dirty="0" err="1" smtClean="0"/&gt;&lt;a:t&gt;}azylay{/g59:&lt;/a:t&gt;&lt;/a:r&gt;}</a:t>
+            </a:r>
+            <a:r>
+              <a:rPr lang="fr-FR" dirty="0" smtClean="0"/>
+              <a:t>{g60:&lt;a:r&gt;&lt;a:rPr lang="fr-FR" dirty="0" smtClean="0"/&gt;&lt;a:t&gt;} ogday. {/g61:&lt;/a:t&gt;&lt;/a:r&gt;}</a:t>
             </a:r>
             <a:br>
               <a:rPr lang="fr-FR" dirty="0" smtClean="0"/>
@@ -3238,127 +3238,127 @@
             </a:br>
             <a:r>
               <a:rPr lang="fr-FR" dirty="0" smtClean="0"/>
-              <a:t>{g65:-ERR:REF-NOT-FOUND-}ethay uickqay {/g66:&lt;/a:t&gt;&lt;/a:r&gt;}</a:t>
-            </a:r>
-            <a:r>
-              <a:rPr lang="fr-FR" dirty="0" err="1" smtClean="0"/>
-              <a:t>{g67:-ERR:REF-NOT-FOUND-}ownbray{/g68:&lt;/a:t&gt;&lt;/a:r&gt;}</a:t>
-            </a:r>
-            <a:r>
-              <a:rPr lang="fr-FR" dirty="0" smtClean="0"/>
-              <a:t>{g69:-ERR:REF-NOT-FOUND-} oxfay {/g70:&lt;/a:t&gt;&lt;/a:r&gt;}</a:t>
-            </a:r>
-            <a:r>
-              <a:rPr lang="fr-FR" dirty="0" err="1" smtClean="0"/>
-              <a:t>{g71:-ERR:REF-NOT-FOUND-}umpsjay{/g72:&lt;/a:t&gt;&lt;/a:r&gt;}</a:t>
-            </a:r>
-            <a:r>
-              <a:rPr lang="fr-FR" dirty="0" smtClean="0"/>
-              <a:t>{g73:-ERR:REF-NOT-FOUND-} overhay ethay {/g74:&lt;/a:t&gt;&lt;/a:r&gt;}</a:t>
-            </a:r>
-            <a:r>
-              <a:rPr lang="fr-FR" dirty="0" err="1" smtClean="0"/>
-              <a:t>{g75:-ERR:REF-NOT-FOUND-}azylay{/g76:&lt;/a:t&gt;&lt;/a:r&gt;}</a:t>
-            </a:r>
-            <a:r>
-              <a:rPr lang="fr-FR" dirty="0" smtClean="0"/>
-              <a:t>{g77:-ERR:REF-NOT-FOUND-} ogday. ethay uickqay {/g78:&lt;/a:t&gt;&lt;/a:r&gt;}</a:t>
-            </a:r>
-            <a:r>
-              <a:rPr lang="fr-FR" dirty="0" err="1" smtClean="0"/>
-              <a:t>{g79:-ERR:REF-NOT-FOUND-}ownbray{/g80:&lt;/a:t&gt;&lt;/a:r&gt;}</a:t>
-            </a:r>
-            <a:r>
-              <a:rPr lang="fr-FR" dirty="0" smtClean="0"/>
-              <a:t>{g81:-ERR:REF-NOT-FOUND-} oxfay {/g82:&lt;/a:t&gt;&lt;/a:r&gt;}</a:t>
-            </a:r>
-            <a:r>
-              <a:rPr lang="fr-FR" dirty="0" err="1" smtClean="0"/>
-              <a:t>{g83:-ERR:REF-NOT-FOUND-}umpsjay{/g84:&lt;/a:t&gt;&lt;/a:r&gt;}</a:t>
-            </a:r>
-            <a:r>
-              <a:rPr lang="fr-FR" dirty="0" smtClean="0"/>
-              <a:t>{g85:-ERR:REF-NOT-FOUND-} overhay ethay {/g86:&lt;/a:t&gt;&lt;/a:r&gt;}</a:t>
-            </a:r>
-            <a:r>
-              <a:rPr lang="fr-FR" dirty="0" err="1" smtClean="0"/>
-              <a:t>{g87:-ERR:REF-NOT-FOUND-}azylay{/g88:&lt;/a:t&gt;&lt;/a:r&gt;}</a:t>
-            </a:r>
-            <a:r>
-              <a:rPr lang="fr-FR" dirty="0" smtClean="0"/>
-              <a:t>{g89:-ERR:REF-NOT-FOUND-} ogday. ethay uickqay {/g90:&lt;/a:t&gt;&lt;/a:r&gt;}</a:t>
-            </a:r>
-            <a:r>
-              <a:rPr lang="fr-FR" dirty="0" err="1" smtClean="0"/>
-              <a:t>{g91:-ERR:REF-NOT-FOUND-}ownbray{/g92:&lt;/a:t&gt;&lt;/a:r&gt;}</a:t>
-            </a:r>
-            <a:r>
-              <a:rPr lang="fr-FR" dirty="0" smtClean="0"/>
-              <a:t>{g93:-ERR:REF-NOT-FOUND-} oxfay {/g94:&lt;/a:t&gt;&lt;/a:r&gt;}</a:t>
-            </a:r>
-            <a:r>
-              <a:rPr lang="fr-FR" dirty="0" err="1" smtClean="0"/>
-              <a:t>{g95:-ERR:REF-NOT-FOUND-}umpsjay{/g96:&lt;/a:t&gt;&lt;/a:r&gt;}</a:t>
-            </a:r>
-            <a:r>
-              <a:rPr lang="fr-FR" dirty="0" smtClean="0"/>
-              <a:t>{g97:-ERR:REF-NOT-FOUND-} overhay ethay {/g98:&lt;/a:t&gt;&lt;/a:r&gt;}</a:t>
-            </a:r>
-            <a:r>
-              <a:rPr lang="fr-FR" dirty="0" err="1" smtClean="0"/>
-              <a:t>{g99:-ERR:REF-NOT-FOUND-}azylay{/g100:&lt;/a:t&gt;&lt;/a:r&gt;}</a:t>
-            </a:r>
-            <a:r>
-              <a:rPr lang="fr-FR" dirty="0" smtClean="0"/>
-              <a:t>{g101:-ERR:REF-NOT-FOUND-} ogday. ethay uickqay {/g102:&lt;/a:t&gt;&lt;/a:r&gt;}</a:t>
-            </a:r>
-            <a:r>
-              <a:rPr lang="fr-FR" dirty="0" err="1" smtClean="0"/>
-              <a:t>{g103:-ERR:REF-NOT-FOUND-}ownbray{/g104:&lt;/a:t&gt;&lt;/a:r&gt;}</a:t>
-            </a:r>
-            <a:r>
-              <a:rPr lang="fr-FR" dirty="0" smtClean="0"/>
-              <a:t>{g105:-ERR:REF-NOT-FOUND-} oxfay {/g106:&lt;/a:t&gt;&lt;/a:r&gt;}</a:t>
-            </a:r>
-            <a:r>
-              <a:rPr lang="fr-FR" dirty="0" err="1" smtClean="0"/>
-              <a:t>{g107:-ERR:REF-NOT-FOUND-}umpsjay{/g108:&lt;/a:t&gt;&lt;/a:r&gt;}</a:t>
-            </a:r>
-            <a:r>
-              <a:rPr lang="fr-FR" dirty="0" smtClean="0"/>
-              <a:t>{g109:-ERR:REF-NOT-FOUND-} overhay ethay {/g110:&lt;/a:t&gt;&lt;/a:r&gt;}</a:t>
-            </a:r>
-            <a:r>
-              <a:rPr lang="fr-FR" dirty="0" err="1" smtClean="0"/>
-              <a:t>{g111:-ERR:REF-NOT-FOUND-}azylay{/g112:&lt;/a:t&gt;&lt;/a:r&gt;}</a:t>
-            </a:r>
-            <a:r>
-              <a:rPr lang="fr-FR" dirty="0" smtClean="0"/>
-              <a:t>{g113:-ERR:REF-NOT-FOUND-} ogday. ethay uickqay {/g114:&lt;/a:t&gt;&lt;/a:r&gt;}</a:t>
-            </a:r>
-            <a:r>
-              <a:rPr lang="fr-FR" dirty="0" err="1" smtClean="0"/>
-              <a:t>{g115:-ERR:REF-NOT-FOUND-}ownbray{/g116:&lt;/a:t&gt;&lt;/a:r&gt;}</a:t>
-            </a:r>
-            <a:r>
-              <a:rPr lang="fr-FR" dirty="0" smtClean="0"/>
-              <a:t>{g117:-ERR:REF-NOT-FOUND-} oxfay {/g118:&lt;/a:t&gt;&lt;/a:r&gt;}</a:t>
-            </a:r>
-            <a:r>
-              <a:rPr lang="fr-FR" dirty="0" err="1" smtClean="0"/>
-              <a:t>{g119:-ERR:REF-NOT-FOUND-}umpsjay{/g120:&lt;/a:t&gt;&lt;/a:r&gt;}</a:t>
-            </a:r>
-            <a:r>
-              <a:rPr lang="fr-FR" dirty="0" smtClean="0"/>
-              <a:t>{g121:-ERR:REF-NOT-FOUND-} overhay ethay {/g122:&lt;/a:t&gt;&lt;/a:r&gt;}</a:t>
-            </a:r>
-            <a:r>
-              <a:rPr lang="fr-FR" dirty="0" err="1" smtClean="0"/>
-              <a:t>{g123:-ERR:REF-NOT-FOUND-}azylay{/g124:&lt;/a:t&gt;&lt;/a:r&gt;}</a:t>
-            </a:r>
-            <a:r>
-              <a:rPr lang="fr-FR" dirty="0" smtClean="0"/>
-              <a:t>{g125:-ERR:REF-NOT-FOUND-} ogday. {/g126:&lt;/a:t&gt;&lt;/a:r&gt;}</a:t>
+              <a:t>{g65:&lt;a:r&gt;&lt;a:rPr lang="fr-FR" dirty="0" smtClean="0"/&gt;&lt;a:t&gt;}ethay uickqay {/g66:&lt;/a:t&gt;&lt;/a:r&gt;}</a:t>
+            </a:r>
+            <a:r>
+              <a:rPr lang="fr-FR" dirty="0" err="1" smtClean="0"/>
+              <a:t>{g67:&lt;a:r&gt;&lt;a:rPr lang="fr-FR" dirty="0" err="1" smtClean="0"/&gt;&lt;a:t&gt;}ownbray{/g68:&lt;/a:t&gt;&lt;/a:r&gt;}</a:t>
+            </a:r>
+            <a:r>
+              <a:rPr lang="fr-FR" dirty="0" smtClean="0"/>
+              <a:t>{g69:&lt;a:r&gt;&lt;a:rPr lang="fr-FR" dirty="0" smtClean="0"/&gt;&lt;a:t&gt;} oxfay {/g70:&lt;/a:t&gt;&lt;/a:r&gt;}</a:t>
+            </a:r>
+            <a:r>
+              <a:rPr lang="fr-FR" dirty="0" err="1" smtClean="0"/>
+              <a:t>{g71:&lt;a:r&gt;&lt;a:rPr lang="fr-FR" dirty="0" err="1" smtClean="0"/&gt;&lt;a:t&gt;}umpsjay{/g72:&lt;/a:t&gt;&lt;/a:r&gt;}</a:t>
+            </a:r>
+            <a:r>
+              <a:rPr lang="fr-FR" dirty="0" smtClean="0"/>
+              <a:t>{g73:&lt;a:r&gt;&lt;a:rPr lang="fr-FR" dirty="0" smtClean="0"/&gt;&lt;a:t&gt;} overhay ethay {/g74:&lt;/a:t&gt;&lt;/a:r&gt;}</a:t>
+            </a:r>
+            <a:r>
+              <a:rPr lang="fr-FR" dirty="0" err="1" smtClean="0"/>
+              <a:t>{g75:&lt;a:r&gt;&lt;a:rPr lang="fr-FR" dirty="0" err="1" smtClean="0"/&gt;&lt;a:t&gt;}azylay{/g76:&lt;/a:t&gt;&lt;/a:r&gt;}</a:t>
+            </a:r>
+            <a:r>
+              <a:rPr lang="fr-FR" dirty="0" smtClean="0"/>
+              <a:t>{g77:&lt;a:r&gt;&lt;a:rPr lang="fr-FR" dirty="0" smtClean="0"/&gt;&lt;a:t&gt;} ogday. ethay uickqay {/g78:&lt;/a:t&gt;&lt;/a:r&gt;}</a:t>
+            </a:r>
+            <a:r>
+              <a:rPr lang="fr-FR" dirty="0" err="1" smtClean="0"/>
+              <a:t>{g79:&lt;a:r&gt;&lt;a:rPr lang="fr-FR" dirty="0" err="1" smtClean="0"/&gt;&lt;a:t&gt;}ownbray{/g80:&lt;/a:t&gt;&lt;/a:r&gt;}</a:t>
+            </a:r>
+            <a:r>
+              <a:rPr lang="fr-FR" dirty="0" smtClean="0"/>
+              <a:t>{g81:&lt;a:r&gt;&lt;a:rPr lang="fr-FR" dirty="0" smtClean="0"/&gt;&lt;a:t&gt;} oxfay {/g82:&lt;/a:t&gt;&lt;/a:r&gt;}</a:t>
+            </a:r>
+            <a:r>
+              <a:rPr lang="fr-FR" dirty="0" err="1" smtClean="0"/>
+              <a:t>{g83:&lt;a:r&gt;&lt;a:rPr lang="fr-FR" dirty="0" err="1" smtClean="0"/&gt;&lt;a:t&gt;}umpsjay{/g84:&lt;/a:t&gt;&lt;/a:r&gt;}</a:t>
+            </a:r>
+            <a:r>
+              <a:rPr lang="fr-FR" dirty="0" smtClean="0"/>
+              <a:t>{g85:&lt;a:r&gt;&lt;a:rPr lang="fr-FR" dirty="0" smtClean="0"/&gt;&lt;a:t&gt;} overhay ethay {/g86:&lt;/a:t&gt;&lt;/a:r&gt;}</a:t>
+            </a:r>
+            <a:r>
+              <a:rPr lang="fr-FR" dirty="0" err="1" smtClean="0"/>
+              <a:t>{g87:&lt;a:r&gt;&lt;a:rPr lang="fr-FR" dirty="0" err="1" smtClean="0"/&gt;&lt;a:t&gt;}azylay{/g88:&lt;/a:t&gt;&lt;/a:r&gt;}</a:t>
+            </a:r>
+            <a:r>
+              <a:rPr lang="fr-FR" dirty="0" smtClean="0"/>
+              <a:t>{g89:&lt;a:r&gt;&lt;a:rPr lang="fr-FR" dirty="0" smtClean="0"/&gt;&lt;a:t&gt;} ogday. ethay uickqay {/g90:&lt;/a:t&gt;&lt;/a:r&gt;}</a:t>
+            </a:r>
+            <a:r>
+              <a:rPr lang="fr-FR" dirty="0" err="1" smtClean="0"/>
+              <a:t>{g91:&lt;a:r&gt;&lt;a:rPr lang="fr-FR" dirty="0" err="1" smtClean="0"/&gt;&lt;a:t&gt;}ownbray{/g92:&lt;/a:t&gt;&lt;/a:r&gt;}</a:t>
+            </a:r>
+            <a:r>
+              <a:rPr lang="fr-FR" dirty="0" smtClean="0"/>
+              <a:t>{g93:&lt;a:r&gt;&lt;a:rPr lang="fr-FR" dirty="0" smtClean="0"/&gt;&lt;a:t&gt;} oxfay {/g94:&lt;/a:t&gt;&lt;/a:r&gt;}</a:t>
+            </a:r>
+            <a:r>
+              <a:rPr lang="fr-FR" dirty="0" err="1" smtClean="0"/>
+              <a:t>{g95:&lt;a:r&gt;&lt;a:rPr lang="fr-FR" dirty="0" err="1" smtClean="0"/&gt;&lt;a:t&gt;}umpsjay{/g96:&lt;/a:t&gt;&lt;/a:r&gt;}</a:t>
+            </a:r>
+            <a:r>
+              <a:rPr lang="fr-FR" dirty="0" smtClean="0"/>
+              <a:t>{g97:&lt;a:r&gt;&lt;a:rPr lang="fr-FR" dirty="0" smtClean="0"/&gt;&lt;a:t&gt;} overhay ethay {/g98:&lt;/a:t&gt;&lt;/a:r&gt;}</a:t>
+            </a:r>
+            <a:r>
+              <a:rPr lang="fr-FR" dirty="0" err="1" smtClean="0"/>
+              <a:t>{g99:&lt;a:r&gt;&lt;a:rPr lang="fr-FR" dirty="0" err="1" smtClean="0"/&gt;&lt;a:t&gt;}azylay{/g100:&lt;/a:t&gt;&lt;/a:r&gt;}</a:t>
+            </a:r>
+            <a:r>
+              <a:rPr lang="fr-FR" dirty="0" smtClean="0"/>
+              <a:t>{g101:&lt;a:r&gt;&lt;a:rPr lang="fr-FR" dirty="0" smtClean="0"/&gt;&lt;a:t&gt;} ogday. ethay uickqay {/g102:&lt;/a:t&gt;&lt;/a:r&gt;}</a:t>
+            </a:r>
+            <a:r>
+              <a:rPr lang="fr-FR" dirty="0" err="1" smtClean="0"/>
+              <a:t>{g103:&lt;a:r&gt;&lt;a:rPr lang="fr-FR" dirty="0" err="1" smtClean="0"/&gt;&lt;a:t&gt;}ownbray{/g104:&lt;/a:t&gt;&lt;/a:r&gt;}</a:t>
+            </a:r>
+            <a:r>
+              <a:rPr lang="fr-FR" dirty="0" smtClean="0"/>
+              <a:t>{g105:&lt;a:r&gt;&lt;a:rPr lang="fr-FR" dirty="0" smtClean="0"/&gt;&lt;a:t&gt;} oxfay {/g106:&lt;/a:t&gt;&lt;/a:r&gt;}</a:t>
+            </a:r>
+            <a:r>
+              <a:rPr lang="fr-FR" dirty="0" err="1" smtClean="0"/>
+              <a:t>{g107:&lt;a:r&gt;&lt;a:rPr lang="fr-FR" dirty="0" err="1" smtClean="0"/&gt;&lt;a:t&gt;}umpsjay{/g108:&lt;/a:t&gt;&lt;/a:r&gt;}</a:t>
+            </a:r>
+            <a:r>
+              <a:rPr lang="fr-FR" dirty="0" smtClean="0"/>
+              <a:t>{g109:&lt;a:r&gt;&lt;a:rPr lang="fr-FR" dirty="0" smtClean="0"/&gt;&lt;a:t&gt;} overhay ethay {/g110:&lt;/a:t&gt;&lt;/a:r&gt;}</a:t>
+            </a:r>
+            <a:r>
+              <a:rPr lang="fr-FR" dirty="0" err="1" smtClean="0"/>
+              <a:t>{g111:&lt;a:r&gt;&lt;a:rPr lang="fr-FR" dirty="0" err="1" smtClean="0"/&gt;&lt;a:t&gt;}azylay{/g112:&lt;/a:t&gt;&lt;/a:r&gt;}</a:t>
+            </a:r>
+            <a:r>
+              <a:rPr lang="fr-FR" dirty="0" smtClean="0"/>
+              <a:t>{g113:&lt;a:r&gt;&lt;a:rPr lang="fr-FR" dirty="0" smtClean="0"/&gt;&lt;a:t&gt;} ogday. ethay uickqay {/g114:&lt;/a:t&gt;&lt;/a:r&gt;}</a:t>
+            </a:r>
+            <a:r>
+              <a:rPr lang="fr-FR" dirty="0" err="1" smtClean="0"/>
+              <a:t>{g115:&lt;a:r&gt;&lt;a:rPr lang="fr-FR" dirty="0" err="1" smtClean="0"/&gt;&lt;a:t&gt;}ownbray{/g116:&lt;/a:t&gt;&lt;/a:r&gt;}</a:t>
+            </a:r>
+            <a:r>
+              <a:rPr lang="fr-FR" dirty="0" smtClean="0"/>
+              <a:t>{g117:&lt;a:r&gt;&lt;a:rPr lang="fr-FR" dirty="0" smtClean="0"/&gt;&lt;a:t&gt;} oxfay {/g118:&lt;/a:t&gt;&lt;/a:r&gt;}</a:t>
+            </a:r>
+            <a:r>
+              <a:rPr lang="fr-FR" dirty="0" err="1" smtClean="0"/>
+              <a:t>{g119:&lt;a:r&gt;&lt;a:rPr lang="fr-FR" dirty="0" err="1" smtClean="0"/&gt;&lt;a:t&gt;}umpsjay{/g120:&lt;/a:t&gt;&lt;/a:r&gt;}</a:t>
+            </a:r>
+            <a:r>
+              <a:rPr lang="fr-FR" dirty="0" smtClean="0"/>
+              <a:t>{g121:&lt;a:r&gt;&lt;a:rPr lang="fr-FR" dirty="0" smtClean="0"/&gt;&lt;a:t&gt;} overhay ethay {/g122:&lt;/a:t&gt;&lt;/a:r&gt;}</a:t>
+            </a:r>
+            <a:r>
+              <a:rPr lang="fr-FR" dirty="0" err="1" smtClean="0"/>
+              <a:t>{g123:&lt;a:r&gt;&lt;a:rPr lang="fr-FR" dirty="0" err="1" smtClean="0"/&gt;&lt;a:t&gt;}azylay{/g124:&lt;/a:t&gt;&lt;/a:r&gt;}</a:t>
+            </a:r>
+            <a:r>
+              <a:rPr lang="fr-FR" dirty="0" smtClean="0"/>
+              <a:t>{g125:&lt;a:r&gt;&lt;a:rPr lang="fr-FR" dirty="0" smtClean="0"/&gt;&lt;a:t&gt;} ogday. {/g126:&lt;/a:t&gt;&lt;/a:r&gt;}</a:t>
             </a:r>
             <a:br>
               <a:rPr lang="fr-FR" dirty="0" smtClean="0"/>
@@ -3372,127 +3372,127 @@
             </a:br>
             <a:r>
               <a:rPr lang="fr-FR" dirty="0" smtClean="0"/>
-              <a:t>{g130:-ERR:REF-NOT-FOUND-}ethay uickqay {/g131:&lt;/a:t&gt;&lt;/a:r&gt;}</a:t>
-            </a:r>
-            <a:r>
-              <a:rPr lang="fr-FR" dirty="0" err="1" smtClean="0"/>
-              <a:t>{g132:-ERR:REF-NOT-FOUND-}ownbray{/g133:&lt;/a:t&gt;&lt;/a:r&gt;}</a:t>
-            </a:r>
-            <a:r>
-              <a:rPr lang="fr-FR" dirty="0" smtClean="0"/>
-              <a:t>{g134:-ERR:REF-NOT-FOUND-} oxfay {/g135:&lt;/a:t&gt;&lt;/a:r&gt;}</a:t>
-            </a:r>
-            <a:r>
-              <a:rPr lang="fr-FR" dirty="0" err="1" smtClean="0"/>
-              <a:t>{g136:-ERR:REF-NOT-FOUND-}umpsjay{/g137:&lt;/a:t&gt;&lt;/a:r&gt;}</a:t>
-            </a:r>
-            <a:r>
-              <a:rPr lang="fr-FR" dirty="0" smtClean="0"/>
-              <a:t>{g138:-ERR:REF-NOT-FOUND-} overhay ethay {/g139:&lt;/a:t&gt;&lt;/a:r&gt;}</a:t>
-            </a:r>
-            <a:r>
-              <a:rPr lang="fr-FR" dirty="0" err="1" smtClean="0"/>
-              <a:t>{g140:-ERR:REF-NOT-FOUND-}azylay{/g141:&lt;/a:t&gt;&lt;/a:r&gt;}</a:t>
-            </a:r>
-            <a:r>
-              <a:rPr lang="fr-FR" dirty="0" smtClean="0"/>
-              <a:t>{g142:-ERR:REF-NOT-FOUND-} ogday. ethay uickqay {/g143:&lt;/a:t&gt;&lt;/a:r&gt;}</a:t>
-            </a:r>
-            <a:r>
-              <a:rPr lang="fr-FR" dirty="0" err="1" smtClean="0"/>
-              <a:t>{g144:-ERR:REF-NOT-FOUND-}ownbray{/g145:&lt;/a:t&gt;&lt;/a:r&gt;}</a:t>
-            </a:r>
-            <a:r>
-              <a:rPr lang="fr-FR" dirty="0" smtClean="0"/>
-              <a:t>{g146:-ERR:REF-NOT-FOUND-} oxfay {/g147:&lt;/a:t&gt;&lt;/a:r&gt;}</a:t>
-            </a:r>
-            <a:r>
-              <a:rPr lang="fr-FR" dirty="0" err="1" smtClean="0"/>
-              <a:t>{g148:-ERR:REF-NOT-FOUND-}umpsjay{/g149:&lt;/a:t&gt;&lt;/a:r&gt;}</a:t>
-            </a:r>
-            <a:r>
-              <a:rPr lang="fr-FR" dirty="0" smtClean="0"/>
-              <a:t>{g150:-ERR:REF-NOT-FOUND-} overhay ethay {/g151:&lt;/a:t&gt;&lt;/a:r&gt;}</a:t>
-            </a:r>
-            <a:r>
-              <a:rPr lang="fr-FR" dirty="0" err="1" smtClean="0"/>
-              <a:t>{g152:-ERR:REF-NOT-FOUND-}azylay{/g153:&lt;/a:t&gt;&lt;/a:r&gt;}</a:t>
-            </a:r>
-            <a:r>
-              <a:rPr lang="fr-FR" dirty="0" smtClean="0"/>
-              <a:t>{g154:-ERR:REF-NOT-FOUND-} ogday. ethay uickqay {/g155:&lt;/a:t&gt;&lt;/a:r&gt;}</a:t>
-            </a:r>
-            <a:r>
-              <a:rPr lang="fr-FR" dirty="0" err="1" smtClean="0"/>
-              <a:t>{g156:-ERR:REF-NOT-FOUND-}ownbray{/g157:&lt;/a:t&gt;&lt;/a:r&gt;}</a:t>
-            </a:r>
-            <a:r>
-              <a:rPr lang="fr-FR" dirty="0" smtClean="0"/>
-              <a:t>{g158:-ERR:REF-NOT-FOUND-} oxfay {/g159:&lt;/a:t&gt;&lt;/a:r&gt;}</a:t>
-            </a:r>
-            <a:r>
-              <a:rPr lang="fr-FR" dirty="0" err="1" smtClean="0"/>
-              <a:t>{g160:-ERR:REF-NOT-FOUND-}umpsjay{/g161:&lt;/a:t&gt;&lt;/a:r&gt;}</a:t>
-            </a:r>
-            <a:r>
-              <a:rPr lang="fr-FR" dirty="0" smtClean="0"/>
-              <a:t>{g162:-ERR:REF-NOT-FOUND-} overhay ethay {/g163:&lt;/a:t&gt;&lt;/a:r&gt;}</a:t>
-            </a:r>
-            <a:r>
-              <a:rPr lang="fr-FR" dirty="0" err="1" smtClean="0"/>
-              <a:t>{g164:-ERR:REF-NOT-FOUND-}azylay{/g165:&lt;/a:t&gt;&lt;/a:r&gt;}</a:t>
-            </a:r>
-            <a:r>
-              <a:rPr lang="fr-FR" dirty="0" smtClean="0"/>
-              <a:t>{g166:-ERR:REF-NOT-FOUND-} ogday. ethay uickqay {/g167:&lt;/a:t&gt;&lt;/a:r&gt;}</a:t>
-            </a:r>
-            <a:r>
-              <a:rPr lang="fr-FR" dirty="0" err="1" smtClean="0"/>
-              <a:t>{g168:-ERR:REF-NOT-FOUND-}ownbray{/g169:&lt;/a:t&gt;&lt;/a:r&gt;}</a:t>
-            </a:r>
-            <a:r>
-              <a:rPr lang="fr-FR" dirty="0" smtClean="0"/>
-              <a:t>{g170:-ERR:REF-NOT-FOUND-} oxfay {/g171:&lt;/a:t&gt;&lt;/a:r&gt;}</a:t>
-            </a:r>
-            <a:r>
-              <a:rPr lang="fr-FR" dirty="0" err="1" smtClean="0"/>
-              <a:t>{g172:-ERR:REF-NOT-FOUND-}umpsjay{/g173:&lt;/a:t&gt;&lt;/a:r&gt;}</a:t>
-            </a:r>
-            <a:r>
-              <a:rPr lang="fr-FR" dirty="0" smtClean="0"/>
-              <a:t>{g174:-ERR:REF-NOT-FOUND-} overhay ethay {/g175:&lt;/a:t&gt;&lt;/a:r&gt;}</a:t>
-            </a:r>
-            <a:r>
-              <a:rPr lang="fr-FR" dirty="0" err="1" smtClean="0"/>
-              <a:t>{g176:-ERR:REF-NOT-FOUND-}azylay{/g177:&lt;/a:t&gt;&lt;/a:r&gt;}</a:t>
-            </a:r>
-            <a:r>
-              <a:rPr lang="fr-FR" dirty="0" smtClean="0"/>
-              <a:t>{g178:-ERR:REF-NOT-FOUND-} ogday. ethay uickqay {/g179:&lt;/a:t&gt;&lt;/a:r&gt;}</a:t>
-            </a:r>
-            <a:r>
-              <a:rPr lang="fr-FR" dirty="0" err="1" smtClean="0"/>
-              <a:t>{g180:-ERR:REF-NOT-FOUND-}ownbray{/g181:&lt;/a:t&gt;&lt;/a:r&gt;}</a:t>
-            </a:r>
-            <a:r>
-              <a:rPr lang="fr-FR" dirty="0" smtClean="0"/>
-              <a:t>{g182:-ERR:REF-NOT-FOUND-} oxfay {/g183:&lt;/a:t&gt;&lt;/a:r&gt;}</a:t>
-            </a:r>
-            <a:r>
-              <a:rPr lang="fr-FR" dirty="0" err="1" smtClean="0"/>
-              <a:t>{g184:-ERR:REF-NOT-FOUND-}umpsjay{/g185:&lt;/a:t&gt;&lt;/a:r&gt;}</a:t>
-            </a:r>
-            <a:r>
-              <a:rPr lang="fr-FR" dirty="0" smtClean="0"/>
-              <a:t>{g186:-ERR:REF-NOT-FOUND-} overhay ethay {/g187:&lt;/a:t&gt;&lt;/a:r&gt;}</a:t>
-            </a:r>
-            <a:r>
-              <a:rPr lang="fr-FR" dirty="0" err="1" smtClean="0"/>
-              <a:t>{g188:-ERR:REF-NOT-FOUND-}azylay{/g189:&lt;/a:t&gt;&lt;/a:r&gt;}</a:t>
-            </a:r>
-            <a:r>
-              <a:rPr lang="fr-FR" dirty="0" smtClean="0"/>
-              <a:t>{g190:-ERR:REF-NOT-FOUND-} ogday. {/g191:&lt;/a:t&gt;&lt;/a:r&gt;}</a:t>
+              <a:t>{g130:&lt;a:r&gt;&lt;a:rPr lang="fr-FR" dirty="0" smtClean="0"/&gt;&lt;a:t&gt;}ethay uickqay {/g131:&lt;/a:t&gt;&lt;/a:r&gt;}</a:t>
+            </a:r>
+            <a:r>
+              <a:rPr lang="fr-FR" dirty="0" err="1" smtClean="0"/>
+              <a:t>{g132:&lt;a:r&gt;&lt;a:rPr lang="fr-FR" dirty="0" err="1" smtClean="0"/&gt;&lt;a:t&gt;}ownbray{/g133:&lt;/a:t&gt;&lt;/a:r&gt;}</a:t>
+            </a:r>
+            <a:r>
+              <a:rPr lang="fr-FR" dirty="0" smtClean="0"/>
+              <a:t>{g134:&lt;a:r&gt;&lt;a:rPr lang="fr-FR" dirty="0" smtClean="0"/&gt;&lt;a:t&gt;} oxfay {/g135:&lt;/a:t&gt;&lt;/a:r&gt;}</a:t>
+            </a:r>
+            <a:r>
+              <a:rPr lang="fr-FR" dirty="0" err="1" smtClean="0"/>
+              <a:t>{g136:&lt;a:r&gt;&lt;a:rPr lang="fr-FR" dirty="0" err="1" smtClean="0"/&gt;&lt;a:t&gt;}umpsjay{/g137:&lt;/a:t&gt;&lt;/a:r&gt;}</a:t>
+            </a:r>
+            <a:r>
+              <a:rPr lang="fr-FR" dirty="0" smtClean="0"/>
+              <a:t>{g138:&lt;a:r&gt;&lt;a:rPr lang="fr-FR" dirty="0" smtClean="0"/&gt;&lt;a:t&gt;} overhay ethay {/g139:&lt;/a:t&gt;&lt;/a:r&gt;}</a:t>
+            </a:r>
+            <a:r>
+              <a:rPr lang="fr-FR" dirty="0" err="1" smtClean="0"/>
+              <a:t>{g140:&lt;a:r&gt;&lt;a:rPr lang="fr-FR" dirty="0" err="1" smtClean="0"/&gt;&lt;a:t&gt;}azylay{/g141:&lt;/a:t&gt;&lt;/a:r&gt;}</a:t>
+            </a:r>
+            <a:r>
+              <a:rPr lang="fr-FR" dirty="0" smtClean="0"/>
+              <a:t>{g142:&lt;a:r&gt;&lt;a:rPr lang="fr-FR" dirty="0" smtClean="0"/&gt;&lt;a:t&gt;} ogday. ethay uickqay {/g143:&lt;/a:t&gt;&lt;/a:r&gt;}</a:t>
+            </a:r>
+            <a:r>
+              <a:rPr lang="fr-FR" dirty="0" err="1" smtClean="0"/>
+              <a:t>{g144:&lt;a:r&gt;&lt;a:rPr lang="fr-FR" dirty="0" err="1" smtClean="0"/&gt;&lt;a:t&gt;}ownbray{/g145:&lt;/a:t&gt;&lt;/a:r&gt;}</a:t>
+            </a:r>
+            <a:r>
+              <a:rPr lang="fr-FR" dirty="0" smtClean="0"/>
+              <a:t>{g146:&lt;a:r&gt;&lt;a:rPr lang="fr-FR" dirty="0" smtClean="0"/&gt;&lt;a:t&gt;} oxfay {/g147:&lt;/a:t&gt;&lt;/a:r&gt;}</a:t>
+            </a:r>
+            <a:r>
+              <a:rPr lang="fr-FR" dirty="0" err="1" smtClean="0"/>
+              <a:t>{g148:&lt;a:r&gt;&lt;a:rPr lang="fr-FR" dirty="0" err="1" smtClean="0"/&gt;&lt;a:t&gt;}umpsjay{/g149:&lt;/a:t&gt;&lt;/a:r&gt;}</a:t>
+            </a:r>
+            <a:r>
+              <a:rPr lang="fr-FR" dirty="0" smtClean="0"/>
+              <a:t>{g150:&lt;a:r&gt;&lt;a:rPr lang="fr-FR" dirty="0" smtClean="0"/&gt;&lt;a:t&gt;} overhay ethay {/g151:&lt;/a:t&gt;&lt;/a:r&gt;}</a:t>
+            </a:r>
+            <a:r>
+              <a:rPr lang="fr-FR" dirty="0" err="1" smtClean="0"/>
+              <a:t>{g152:&lt;a:r&gt;&lt;a:rPr lang="fr-FR" dirty="0" err="1" smtClean="0"/&gt;&lt;a:t&gt;}azylay{/g153:&lt;/a:t&gt;&lt;/a:r&gt;}</a:t>
+            </a:r>
+            <a:r>
+              <a:rPr lang="fr-FR" dirty="0" smtClean="0"/>
+              <a:t>{g154:&lt;a:r&gt;&lt;a:rPr lang="fr-FR" dirty="0" smtClean="0"/&gt;&lt;a:t&gt;} ogday. ethay uickqay {/g155:&lt;/a:t&gt;&lt;/a:r&gt;}</a:t>
+            </a:r>
+            <a:r>
+              <a:rPr lang="fr-FR" dirty="0" err="1" smtClean="0"/>
+              <a:t>{g156:&lt;a:r&gt;&lt;a:rPr lang="fr-FR" dirty="0" err="1" smtClean="0"/&gt;&lt;a:t&gt;}ownbray{/g157:&lt;/a:t&gt;&lt;/a:r&gt;}</a:t>
+            </a:r>
+            <a:r>
+              <a:rPr lang="fr-FR" dirty="0" smtClean="0"/>
+              <a:t>{g158:&lt;a:r&gt;&lt;a:rPr lang="fr-FR" dirty="0" smtClean="0"/&gt;&lt;a:t&gt;} oxfay {/g159:&lt;/a:t&gt;&lt;/a:r&gt;}</a:t>
+            </a:r>
+            <a:r>
+              <a:rPr lang="fr-FR" dirty="0" err="1" smtClean="0"/>
+              <a:t>{g160:&lt;a:r&gt;&lt;a:rPr lang="fr-FR" dirty="0" err="1" smtClean="0"/&gt;&lt;a:t&gt;}umpsjay{/g161:&lt;/a:t&gt;&lt;/a:r&gt;}</a:t>
+            </a:r>
+            <a:r>
+              <a:rPr lang="fr-FR" dirty="0" smtClean="0"/>
+              <a:t>{g162:&lt;a:r&gt;&lt;a:rPr lang="fr-FR" dirty="0" smtClean="0"/&gt;&lt;a:t&gt;} overhay ethay {/g163:&lt;/a:t&gt;&lt;/a:r&gt;}</a:t>
+            </a:r>
+            <a:r>
+              <a:rPr lang="fr-FR" dirty="0" err="1" smtClean="0"/>
+              <a:t>{g164:&lt;a:r&gt;&lt;a:rPr lang="fr-FR" dirty="0" err="1" smtClean="0"/&gt;&lt;a:t&gt;}azylay{/g165:&lt;/a:t&gt;&lt;/a:r&gt;}</a:t>
+            </a:r>
+            <a:r>
+              <a:rPr lang="fr-FR" dirty="0" smtClean="0"/>
+              <a:t>{g166:&lt;a:r&gt;&lt;a:rPr lang="fr-FR" dirty="0" smtClean="0"/&gt;&lt;a:t&gt;} ogday. ethay uickqay {/g167:&lt;/a:t&gt;&lt;/a:r&gt;}</a:t>
+            </a:r>
+            <a:r>
+              <a:rPr lang="fr-FR" dirty="0" err="1" smtClean="0"/>
+              <a:t>{g168:&lt;a:r&gt;&lt;a:rPr lang="fr-FR" dirty="0" err="1" smtClean="0"/&gt;&lt;a:t&gt;}ownbray{/g169:&lt;/a:t&gt;&lt;/a:r&gt;}</a:t>
+            </a:r>
+            <a:r>
+              <a:rPr lang="fr-FR" dirty="0" smtClean="0"/>
+              <a:t>{g170:&lt;a:r&gt;&lt;a:rPr lang="fr-FR" dirty="0" smtClean="0"/&gt;&lt;a:t&gt;} oxfay {/g171:&lt;/a:t&gt;&lt;/a:r&gt;}</a:t>
+            </a:r>
+            <a:r>
+              <a:rPr lang="fr-FR" dirty="0" err="1" smtClean="0"/>
+              <a:t>{g172:&lt;a:r&gt;&lt;a:rPr lang="fr-FR" dirty="0" err="1" smtClean="0"/&gt;&lt;a:t&gt;}umpsjay{/g173:&lt;/a:t&gt;&lt;/a:r&gt;}</a:t>
+            </a:r>
+            <a:r>
+              <a:rPr lang="fr-FR" dirty="0" smtClean="0"/>
+              <a:t>{g174:&lt;a:r&gt;&lt;a:rPr lang="fr-FR" dirty="0" smtClean="0"/&gt;&lt;a:t&gt;} overhay ethay {/g175:&lt;/a:t&gt;&lt;/a:r&gt;}</a:t>
+            </a:r>
+            <a:r>
+              <a:rPr lang="fr-FR" dirty="0" err="1" smtClean="0"/>
+              <a:t>{g176:&lt;a:r&gt;&lt;a:rPr lang="fr-FR" dirty="0" err="1" smtClean="0"/&gt;&lt;a:t&gt;}azylay{/g177:&lt;/a:t&gt;&lt;/a:r&gt;}</a:t>
+            </a:r>
+            <a:r>
+              <a:rPr lang="fr-FR" dirty="0" smtClean="0"/>
+              <a:t>{g178:&lt;a:r&gt;&lt;a:rPr lang="fr-FR" dirty="0" smtClean="0"/&gt;&lt;a:t&gt;} ogday. ethay uickqay {/g179:&lt;/a:t&gt;&lt;/a:r&gt;}</a:t>
+            </a:r>
+            <a:r>
+              <a:rPr lang="fr-FR" dirty="0" err="1" smtClean="0"/>
+              <a:t>{g180:&lt;a:r&gt;&lt;a:rPr lang="fr-FR" dirty="0" err="1" smtClean="0"/&gt;&lt;a:t&gt;}ownbray{/g181:&lt;/a:t&gt;&lt;/a:r&gt;}</a:t>
+            </a:r>
+            <a:r>
+              <a:rPr lang="fr-FR" dirty="0" smtClean="0"/>
+              <a:t>{g182:&lt;a:r&gt;&lt;a:rPr lang="fr-FR" dirty="0" smtClean="0"/&gt;&lt;a:t&gt;} oxfay {/g183:&lt;/a:t&gt;&lt;/a:r&gt;}</a:t>
+            </a:r>
+            <a:r>
+              <a:rPr lang="fr-FR" dirty="0" err="1" smtClean="0"/>
+              <a:t>{g184:&lt;a:r&gt;&lt;a:rPr lang="fr-FR" dirty="0" err="1" smtClean="0"/&gt;&lt;a:t&gt;}umpsjay{/g185:&lt;/a:t&gt;&lt;/a:r&gt;}</a:t>
+            </a:r>
+            <a:r>
+              <a:rPr lang="fr-FR" dirty="0" smtClean="0"/>
+              <a:t>{g186:&lt;a:r&gt;&lt;a:rPr lang="fr-FR" dirty="0" smtClean="0"/&gt;&lt;a:t&gt;} overhay ethay {/g187:&lt;/a:t&gt;&lt;/a:r&gt;}</a:t>
+            </a:r>
+            <a:r>
+              <a:rPr lang="fr-FR" dirty="0" err="1" smtClean="0"/>
+              <a:t>{g188:&lt;a:r&gt;&lt;a:rPr lang="fr-FR" dirty="0" err="1" smtClean="0"/&gt;&lt;a:t&gt;}azylay{/g189:&lt;/a:t&gt;&lt;/a:r&gt;}</a:t>
+            </a:r>
+            <a:r>
+              <a:rPr lang="fr-FR" dirty="0" smtClean="0"/>
+              <a:t>{g190:&lt;a:r&gt;&lt;a:rPr lang="fr-FR" dirty="0" smtClean="0"/&gt;&lt;a:t&gt;} ogday. {/g191:&lt;/a:t&gt;&lt;/a:r&gt;}</a:t>
             </a:r>
             <a:br>
               <a:rPr lang="fr-FR" dirty="0" smtClean="0"/>

</xml_diff>